<commit_message>
module 4 & media updates
</commit_message>
<xml_diff>
--- a/materials_science_renderings/assets/handouts/04.01_defects.pptx
+++ b/materials_science_renderings/assets/handouts/04.01_defects.pptx
@@ -5,10 +5,10 @@
     <p:sldMasterId id="2147483648" r:id="rId3"/>
   </p:sldMasterIdLst>
   <p:notesMasterIdLst>
-    <p:notesMasterId r:id="rId17"/>
+    <p:notesMasterId r:id="rId10"/>
   </p:notesMasterIdLst>
   <p:handoutMasterIdLst>
-    <p:handoutMasterId r:id="rId18"/>
+    <p:handoutMasterId r:id="rId11"/>
   </p:handoutMasterIdLst>
   <p:sldIdLst>
     <p:sldId id="277" r:id="rId4"/>
@@ -17,13 +17,6 @@
     <p:sldId id="285" r:id="rId7"/>
     <p:sldId id="279" r:id="rId8"/>
     <p:sldId id="343" r:id="rId9"/>
-    <p:sldId id="329" r:id="rId10"/>
-    <p:sldId id="356" r:id="rId11"/>
-    <p:sldId id="358" r:id="rId12"/>
-    <p:sldId id="359" r:id="rId13"/>
-    <p:sldId id="360" r:id="rId14"/>
-    <p:sldId id="326" r:id="rId15"/>
-    <p:sldId id="327" r:id="rId16"/>
   </p:sldIdLst>
   <p:sldSz cx="9144000" cy="6858000" type="screen4x3"/>
   <p:notesSz cx="7315200" cy="9601200"/>
@@ -188,6 +181,64 @@
 <file path=ppt/changesInfos/changesInfo1.xml><?xml version="1.0" encoding="utf-8"?>
 <pc:chgInfo xmlns:a="http://schemas.openxmlformats.org/drawingml/2006/main" xmlns:r="http://schemas.openxmlformats.org/officeDocument/2006/relationships" xmlns:ac="http://schemas.microsoft.com/office/drawing/2013/main/command" xmlns:pc="http://schemas.microsoft.com/office/powerpoint/2013/main/command">
   <pc:docChgLst>
+    <pc:chgData name="Corcoran, Sean" userId="3f12d0a3-3c97-4340-8007-c8fe7e07551f" providerId="ADAL" clId="{849BC2AB-026C-4319-9517-B5115450A25C}"/>
+    <pc:docChg chg="delSld">
+      <pc:chgData name="Corcoran, Sean" userId="3f12d0a3-3c97-4340-8007-c8fe7e07551f" providerId="ADAL" clId="{849BC2AB-026C-4319-9517-B5115450A25C}" dt="2025-01-29T00:42:59.043" v="0" actId="47"/>
+      <pc:docMkLst>
+        <pc:docMk/>
+      </pc:docMkLst>
+      <pc:sldChg chg="del">
+        <pc:chgData name="Corcoran, Sean" userId="3f12d0a3-3c97-4340-8007-c8fe7e07551f" providerId="ADAL" clId="{849BC2AB-026C-4319-9517-B5115450A25C}" dt="2025-01-29T00:42:59.043" v="0" actId="47"/>
+        <pc:sldMkLst>
+          <pc:docMk/>
+          <pc:sldMk cId="0" sldId="326"/>
+        </pc:sldMkLst>
+      </pc:sldChg>
+      <pc:sldChg chg="del">
+        <pc:chgData name="Corcoran, Sean" userId="3f12d0a3-3c97-4340-8007-c8fe7e07551f" providerId="ADAL" clId="{849BC2AB-026C-4319-9517-B5115450A25C}" dt="2025-01-29T00:42:59.043" v="0" actId="47"/>
+        <pc:sldMkLst>
+          <pc:docMk/>
+          <pc:sldMk cId="0" sldId="327"/>
+        </pc:sldMkLst>
+      </pc:sldChg>
+      <pc:sldChg chg="del">
+        <pc:chgData name="Corcoran, Sean" userId="3f12d0a3-3c97-4340-8007-c8fe7e07551f" providerId="ADAL" clId="{849BC2AB-026C-4319-9517-B5115450A25C}" dt="2025-01-29T00:42:59.043" v="0" actId="47"/>
+        <pc:sldMkLst>
+          <pc:docMk/>
+          <pc:sldMk cId="0" sldId="329"/>
+        </pc:sldMkLst>
+      </pc:sldChg>
+      <pc:sldChg chg="del">
+        <pc:chgData name="Corcoran, Sean" userId="3f12d0a3-3c97-4340-8007-c8fe7e07551f" providerId="ADAL" clId="{849BC2AB-026C-4319-9517-B5115450A25C}" dt="2025-01-29T00:42:59.043" v="0" actId="47"/>
+        <pc:sldMkLst>
+          <pc:docMk/>
+          <pc:sldMk cId="2198078673" sldId="356"/>
+        </pc:sldMkLst>
+      </pc:sldChg>
+      <pc:sldChg chg="del">
+        <pc:chgData name="Corcoran, Sean" userId="3f12d0a3-3c97-4340-8007-c8fe7e07551f" providerId="ADAL" clId="{849BC2AB-026C-4319-9517-B5115450A25C}" dt="2025-01-29T00:42:59.043" v="0" actId="47"/>
+        <pc:sldMkLst>
+          <pc:docMk/>
+          <pc:sldMk cId="3334194665" sldId="358"/>
+        </pc:sldMkLst>
+      </pc:sldChg>
+      <pc:sldChg chg="del">
+        <pc:chgData name="Corcoran, Sean" userId="3f12d0a3-3c97-4340-8007-c8fe7e07551f" providerId="ADAL" clId="{849BC2AB-026C-4319-9517-B5115450A25C}" dt="2025-01-29T00:42:59.043" v="0" actId="47"/>
+        <pc:sldMkLst>
+          <pc:docMk/>
+          <pc:sldMk cId="1507353024" sldId="359"/>
+        </pc:sldMkLst>
+      </pc:sldChg>
+      <pc:sldChg chg="del">
+        <pc:chgData name="Corcoran, Sean" userId="3f12d0a3-3c97-4340-8007-c8fe7e07551f" providerId="ADAL" clId="{849BC2AB-026C-4319-9517-B5115450A25C}" dt="2025-01-29T00:42:59.043" v="0" actId="47"/>
+        <pc:sldMkLst>
+          <pc:docMk/>
+          <pc:sldMk cId="240556338" sldId="360"/>
+        </pc:sldMkLst>
+      </pc:sldChg>
+    </pc:docChg>
+  </pc:docChgLst>
+  <pc:docChgLst>
     <pc:chgData name="Corcoran, Sean" userId="3f12d0a3-3c97-4340-8007-c8fe7e07551f" providerId="ADAL" clId="{D5470179-4D0B-45B9-B4D8-8DDA332282FD}"/>
     <pc:docChg chg="delSld">
       <pc:chgData name="Corcoran, Sean" userId="3f12d0a3-3c97-4340-8007-c8fe7e07551f" providerId="ADAL" clId="{D5470179-4D0B-45B9-B4D8-8DDA332282FD}" dt="2024-10-24T17:27:53.051" v="0" actId="47"/>
@@ -352,7 +403,7 @@
             <a:fld id="{B2FAF90E-C05B-49F7-A43B-B464C9611E7F}" type="datetimeFigureOut">
               <a:rPr lang="en-US" smtClean="0"/>
               <a:pPr/>
-              <a:t>10/24/2024</a:t>
+              <a:t>1/28/2025</a:t>
             </a:fld>
             <a:endParaRPr lang="en-US"/>
           </a:p>
@@ -809,7 +860,7 @@
             <a:fld id="{01107224-C24B-4742-97C5-BCCF79FAFC5A}" type="datetimeFigureOut">
               <a:rPr lang="en-US" smtClean="0"/>
               <a:pPr/>
-              <a:t>10/24/2024</a:t>
+              <a:t>1/28/2025</a:t>
             </a:fld>
             <a:endParaRPr lang="en-US"/>
           </a:p>
@@ -1327,819 +1378,6 @@
     <p:extLst>
       <p:ext uri="{BB962C8B-B14F-4D97-AF65-F5344CB8AC3E}">
         <p14:creationId xmlns:p14="http://schemas.microsoft.com/office/powerpoint/2010/main" val="1935477837"/>
-      </p:ext>
-    </p:extLst>
-  </p:cSld>
-  <p:clrMapOvr>
-    <a:masterClrMapping/>
-  </p:clrMapOvr>
-</p:notes>
-</file>
-
-<file path=ppt/notesSlides/notesSlide4.xml><?xml version="1.0" encoding="utf-8"?>
-<p:notes xmlns:a="http://schemas.openxmlformats.org/drawingml/2006/main" xmlns:r="http://schemas.openxmlformats.org/officeDocument/2006/relationships" xmlns:p="http://schemas.openxmlformats.org/presentationml/2006/main">
-  <p:cSld>
-    <p:spTree>
-      <p:nvGrpSpPr>
-        <p:cNvPr id="1" name=""/>
-        <p:cNvGrpSpPr/>
-        <p:nvPr/>
-      </p:nvGrpSpPr>
-      <p:grpSpPr>
-        <a:xfrm>
-          <a:off x="0" y="0"/>
-          <a:ext cx="0" cy="0"/>
-          <a:chOff x="0" y="0"/>
-          <a:chExt cx="0" cy="0"/>
-        </a:xfrm>
-      </p:grpSpPr>
-      <p:sp>
-        <p:nvSpPr>
-          <p:cNvPr id="2" name="Slide Image Placeholder 1"/>
-          <p:cNvSpPr>
-            <a:spLocks noGrp="1" noRot="1" noChangeAspect="1"/>
-          </p:cNvSpPr>
-          <p:nvPr>
-            <p:ph type="sldImg"/>
-          </p:nvPr>
-        </p:nvSpPr>
-        <p:spPr/>
-      </p:sp>
-      <p:sp>
-        <p:nvSpPr>
-          <p:cNvPr id="3" name="Notes Placeholder 2"/>
-          <p:cNvSpPr>
-            <a:spLocks noGrp="1"/>
-          </p:cNvSpPr>
-          <p:nvPr>
-            <p:ph type="body" idx="1"/>
-          </p:nvPr>
-        </p:nvSpPr>
-        <p:spPr/>
-        <p:txBody>
-          <a:bodyPr/>
-          <a:lstStyle/>
-          <a:p>
-            <a:endParaRPr lang="en-US" dirty="0"/>
-          </a:p>
-        </p:txBody>
-      </p:sp>
-      <p:sp>
-        <p:nvSpPr>
-          <p:cNvPr id="4" name="Slide Number Placeholder 3"/>
-          <p:cNvSpPr>
-            <a:spLocks noGrp="1"/>
-          </p:cNvSpPr>
-          <p:nvPr>
-            <p:ph type="sldNum" sz="quarter" idx="5"/>
-          </p:nvPr>
-        </p:nvSpPr>
-        <p:spPr/>
-        <p:txBody>
-          <a:bodyPr/>
-          <a:lstStyle/>
-          <a:p>
-            <a:fld id="{827965A8-693C-4A5A-A2C9-39477FD733AE}" type="slidenum">
-              <a:rPr lang="en-US" smtClean="0"/>
-              <a:pPr/>
-              <a:t>7</a:t>
-            </a:fld>
-            <a:endParaRPr lang="en-US"/>
-          </a:p>
-        </p:txBody>
-      </p:sp>
-    </p:spTree>
-    <p:extLst>
-      <p:ext uri="{BB962C8B-B14F-4D97-AF65-F5344CB8AC3E}">
-        <p14:creationId xmlns:p14="http://schemas.microsoft.com/office/powerpoint/2010/main" val="2950431590"/>
-      </p:ext>
-    </p:extLst>
-  </p:cSld>
-  <p:clrMapOvr>
-    <a:masterClrMapping/>
-  </p:clrMapOvr>
-</p:notes>
-</file>
-
-<file path=ppt/notesSlides/notesSlide5.xml><?xml version="1.0" encoding="utf-8"?>
-<p:notes xmlns:a="http://schemas.openxmlformats.org/drawingml/2006/main" xmlns:r="http://schemas.openxmlformats.org/officeDocument/2006/relationships" xmlns:p="http://schemas.openxmlformats.org/presentationml/2006/main">
-  <p:cSld>
-    <p:spTree>
-      <p:nvGrpSpPr>
-        <p:cNvPr id="1" name=""/>
-        <p:cNvGrpSpPr/>
-        <p:nvPr/>
-      </p:nvGrpSpPr>
-      <p:grpSpPr>
-        <a:xfrm>
-          <a:off x="0" y="0"/>
-          <a:ext cx="0" cy="0"/>
-          <a:chOff x="0" y="0"/>
-          <a:chExt cx="0" cy="0"/>
-        </a:xfrm>
-      </p:grpSpPr>
-      <p:sp>
-        <p:nvSpPr>
-          <p:cNvPr id="2" name="Slide Image Placeholder 1"/>
-          <p:cNvSpPr>
-            <a:spLocks noGrp="1" noRot="1" noChangeAspect="1"/>
-          </p:cNvSpPr>
-          <p:nvPr>
-            <p:ph type="sldImg"/>
-          </p:nvPr>
-        </p:nvSpPr>
-        <p:spPr/>
-      </p:sp>
-      <p:sp>
-        <p:nvSpPr>
-          <p:cNvPr id="3" name="Notes Placeholder 2"/>
-          <p:cNvSpPr>
-            <a:spLocks noGrp="1"/>
-          </p:cNvSpPr>
-          <p:nvPr>
-            <p:ph type="body" idx="1"/>
-          </p:nvPr>
-        </p:nvSpPr>
-        <p:spPr/>
-        <p:txBody>
-          <a:bodyPr/>
-          <a:lstStyle/>
-          <a:p>
-            <a:pPr marL="0" marR="0" lvl="0" indent="0" algn="l" defTabSz="914400" rtl="0" eaLnBrk="1" fontAlgn="auto" latinLnBrk="0" hangingPunct="1">
-              <a:lnSpc>
-                <a:spcPct val="100000"/>
-              </a:lnSpc>
-              <a:spcBef>
-                <a:spcPts val="0"/>
-              </a:spcBef>
-              <a:spcAft>
-                <a:spcPts val="0"/>
-              </a:spcAft>
-              <a:buClrTx/>
-              <a:buSzTx/>
-              <a:buFontTx/>
-              <a:buNone/>
-              <a:tabLst/>
-              <a:defRPr/>
-            </a:pPr>
-            <a:r>
-              <a:rPr lang="en-US" dirty="0"/>
-              <a:t>John </a:t>
-            </a:r>
-            <a:r>
-              <a:rPr lang="en-US" dirty="0" err="1"/>
-              <a:t>Kacher</a:t>
-            </a:r>
-            <a:r>
-              <a:rPr lang="en-US" dirty="0"/>
-              <a:t> Dislocation Glide https://youtu.be/EXbiEopDJ_g</a:t>
-            </a:r>
-          </a:p>
-          <a:p>
-            <a:pPr marL="0" marR="0" lvl="0" indent="0" algn="l" defTabSz="914400" rtl="0" eaLnBrk="1" fontAlgn="auto" latinLnBrk="0" hangingPunct="1">
-              <a:lnSpc>
-                <a:spcPct val="100000"/>
-              </a:lnSpc>
-              <a:spcBef>
-                <a:spcPts val="0"/>
-              </a:spcBef>
-              <a:spcAft>
-                <a:spcPts val="0"/>
-              </a:spcAft>
-              <a:buClrTx/>
-              <a:buSzTx/>
-              <a:buFontTx/>
-              <a:buNone/>
-              <a:tabLst/>
-              <a:defRPr/>
-            </a:pPr>
-            <a:endParaRPr lang="en-US" dirty="0"/>
-          </a:p>
-          <a:p>
-            <a:pPr marL="0" marR="0" lvl="0" indent="0" algn="l" defTabSz="914400" rtl="0" eaLnBrk="1" fontAlgn="auto" latinLnBrk="0" hangingPunct="1">
-              <a:lnSpc>
-                <a:spcPct val="100000"/>
-              </a:lnSpc>
-              <a:spcBef>
-                <a:spcPts val="0"/>
-              </a:spcBef>
-              <a:spcAft>
-                <a:spcPts val="0"/>
-              </a:spcAft>
-              <a:buClrTx/>
-              <a:buSzTx/>
-              <a:buFontTx/>
-              <a:buNone/>
-              <a:tabLst/>
-              <a:defRPr/>
-            </a:pPr>
-            <a:r>
-              <a:rPr lang="en-US" dirty="0"/>
-              <a:t>Excerpt from a longer film on bubble rafts, possibly made in the 1940s by William Lawrence Bragg. https://youtu.be/P345p7A4IW8 </a:t>
-            </a:r>
-          </a:p>
-          <a:p>
-            <a:pPr marL="0" marR="0" lvl="0" indent="0" algn="l" defTabSz="914400" rtl="0" eaLnBrk="1" fontAlgn="auto" latinLnBrk="0" hangingPunct="1">
-              <a:lnSpc>
-                <a:spcPct val="100000"/>
-              </a:lnSpc>
-              <a:spcBef>
-                <a:spcPts val="0"/>
-              </a:spcBef>
-              <a:spcAft>
-                <a:spcPts val="0"/>
-              </a:spcAft>
-              <a:buClrTx/>
-              <a:buSzTx/>
-              <a:buFontTx/>
-              <a:buNone/>
-              <a:tabLst/>
-              <a:defRPr/>
-            </a:pPr>
-            <a:r>
-              <a:rPr lang="en-US" dirty="0"/>
-              <a:t> </a:t>
-            </a:r>
-          </a:p>
-          <a:p>
-            <a:endParaRPr lang="en-US" dirty="0"/>
-          </a:p>
-        </p:txBody>
-      </p:sp>
-      <p:sp>
-        <p:nvSpPr>
-          <p:cNvPr id="4" name="Slide Number Placeholder 3"/>
-          <p:cNvSpPr>
-            <a:spLocks noGrp="1"/>
-          </p:cNvSpPr>
-          <p:nvPr>
-            <p:ph type="sldNum" sz="quarter" idx="5"/>
-          </p:nvPr>
-        </p:nvSpPr>
-        <p:spPr/>
-        <p:txBody>
-          <a:bodyPr/>
-          <a:lstStyle/>
-          <a:p>
-            <a:fld id="{827965A8-693C-4A5A-A2C9-39477FD733AE}" type="slidenum">
-              <a:rPr lang="en-US" smtClean="0"/>
-              <a:pPr/>
-              <a:t>8</a:t>
-            </a:fld>
-            <a:endParaRPr lang="en-US"/>
-          </a:p>
-        </p:txBody>
-      </p:sp>
-    </p:spTree>
-    <p:extLst>
-      <p:ext uri="{BB962C8B-B14F-4D97-AF65-F5344CB8AC3E}">
-        <p14:creationId xmlns:p14="http://schemas.microsoft.com/office/powerpoint/2010/main" val="32942127"/>
-      </p:ext>
-    </p:extLst>
-  </p:cSld>
-  <p:clrMapOvr>
-    <a:masterClrMapping/>
-  </p:clrMapOvr>
-</p:notes>
-</file>
-
-<file path=ppt/notesSlides/notesSlide6.xml><?xml version="1.0" encoding="utf-8"?>
-<p:notes xmlns:a="http://schemas.openxmlformats.org/drawingml/2006/main" xmlns:r="http://schemas.openxmlformats.org/officeDocument/2006/relationships" xmlns:p="http://schemas.openxmlformats.org/presentationml/2006/main">
-  <p:cSld>
-    <p:spTree>
-      <p:nvGrpSpPr>
-        <p:cNvPr id="1" name=""/>
-        <p:cNvGrpSpPr/>
-        <p:nvPr/>
-      </p:nvGrpSpPr>
-      <p:grpSpPr>
-        <a:xfrm>
-          <a:off x="0" y="0"/>
-          <a:ext cx="0" cy="0"/>
-          <a:chOff x="0" y="0"/>
-          <a:chExt cx="0" cy="0"/>
-        </a:xfrm>
-      </p:grpSpPr>
-      <p:sp>
-        <p:nvSpPr>
-          <p:cNvPr id="2" name="Slide Image Placeholder 1"/>
-          <p:cNvSpPr>
-            <a:spLocks noGrp="1" noRot="1" noChangeAspect="1"/>
-          </p:cNvSpPr>
-          <p:nvPr>
-            <p:ph type="sldImg"/>
-          </p:nvPr>
-        </p:nvSpPr>
-        <p:spPr/>
-      </p:sp>
-      <p:sp>
-        <p:nvSpPr>
-          <p:cNvPr id="3" name="Notes Placeholder 2"/>
-          <p:cNvSpPr>
-            <a:spLocks noGrp="1"/>
-          </p:cNvSpPr>
-          <p:nvPr>
-            <p:ph type="body" idx="1"/>
-          </p:nvPr>
-        </p:nvSpPr>
-        <p:spPr/>
-        <p:txBody>
-          <a:bodyPr/>
-          <a:lstStyle/>
-          <a:p>
-            <a:pPr marL="0" marR="0" lvl="0" indent="0" algn="l" defTabSz="914400" rtl="0" eaLnBrk="1" fontAlgn="auto" latinLnBrk="0" hangingPunct="1">
-              <a:lnSpc>
-                <a:spcPct val="100000"/>
-              </a:lnSpc>
-              <a:spcBef>
-                <a:spcPts val="0"/>
-              </a:spcBef>
-              <a:spcAft>
-                <a:spcPts val="0"/>
-              </a:spcAft>
-              <a:buClrTx/>
-              <a:buSzTx/>
-              <a:buFontTx/>
-              <a:buNone/>
-              <a:tabLst/>
-              <a:defRPr/>
-            </a:pPr>
-            <a:r>
-              <a:rPr lang="en-US" dirty="0"/>
-              <a:t>John </a:t>
-            </a:r>
-            <a:r>
-              <a:rPr lang="en-US" dirty="0" err="1"/>
-              <a:t>Kacher</a:t>
-            </a:r>
-            <a:r>
-              <a:rPr lang="en-US" dirty="0"/>
-              <a:t> Dislocation Glide https://youtu.be/EXbiEopDJ_g</a:t>
-            </a:r>
-          </a:p>
-          <a:p>
-            <a:pPr marL="0" marR="0" lvl="0" indent="0" algn="l" defTabSz="914400" rtl="0" eaLnBrk="1" fontAlgn="auto" latinLnBrk="0" hangingPunct="1">
-              <a:lnSpc>
-                <a:spcPct val="100000"/>
-              </a:lnSpc>
-              <a:spcBef>
-                <a:spcPts val="0"/>
-              </a:spcBef>
-              <a:spcAft>
-                <a:spcPts val="0"/>
-              </a:spcAft>
-              <a:buClrTx/>
-              <a:buSzTx/>
-              <a:buFontTx/>
-              <a:buNone/>
-              <a:tabLst/>
-              <a:defRPr/>
-            </a:pPr>
-            <a:endParaRPr lang="en-US" dirty="0"/>
-          </a:p>
-          <a:p>
-            <a:pPr marL="0" marR="0" lvl="0" indent="0" algn="l" defTabSz="914400" rtl="0" eaLnBrk="1" fontAlgn="auto" latinLnBrk="0" hangingPunct="1">
-              <a:lnSpc>
-                <a:spcPct val="100000"/>
-              </a:lnSpc>
-              <a:spcBef>
-                <a:spcPts val="0"/>
-              </a:spcBef>
-              <a:spcAft>
-                <a:spcPts val="0"/>
-              </a:spcAft>
-              <a:buClrTx/>
-              <a:buSzTx/>
-              <a:buFontTx/>
-              <a:buNone/>
-              <a:tabLst/>
-              <a:defRPr/>
-            </a:pPr>
-            <a:r>
-              <a:rPr lang="en-US" dirty="0"/>
-              <a:t>Excerpt from a longer film on bubble rafts, possibly made in the 1940s by William Lawrence Bragg. https://youtu.be/P345p7A4IW8 </a:t>
-            </a:r>
-          </a:p>
-          <a:p>
-            <a:pPr marL="0" marR="0" lvl="0" indent="0" algn="l" defTabSz="914400" rtl="0" eaLnBrk="1" fontAlgn="auto" latinLnBrk="0" hangingPunct="1">
-              <a:lnSpc>
-                <a:spcPct val="100000"/>
-              </a:lnSpc>
-              <a:spcBef>
-                <a:spcPts val="0"/>
-              </a:spcBef>
-              <a:spcAft>
-                <a:spcPts val="0"/>
-              </a:spcAft>
-              <a:buClrTx/>
-              <a:buSzTx/>
-              <a:buFontTx/>
-              <a:buNone/>
-              <a:tabLst/>
-              <a:defRPr/>
-            </a:pPr>
-            <a:r>
-              <a:rPr lang="en-US" dirty="0"/>
-              <a:t> </a:t>
-            </a:r>
-          </a:p>
-          <a:p>
-            <a:endParaRPr lang="en-US" dirty="0"/>
-          </a:p>
-        </p:txBody>
-      </p:sp>
-      <p:sp>
-        <p:nvSpPr>
-          <p:cNvPr id="4" name="Slide Number Placeholder 3"/>
-          <p:cNvSpPr>
-            <a:spLocks noGrp="1"/>
-          </p:cNvSpPr>
-          <p:nvPr>
-            <p:ph type="sldNum" sz="quarter" idx="5"/>
-          </p:nvPr>
-        </p:nvSpPr>
-        <p:spPr/>
-        <p:txBody>
-          <a:bodyPr/>
-          <a:lstStyle/>
-          <a:p>
-            <a:fld id="{827965A8-693C-4A5A-A2C9-39477FD733AE}" type="slidenum">
-              <a:rPr lang="en-US" smtClean="0"/>
-              <a:pPr/>
-              <a:t>9</a:t>
-            </a:fld>
-            <a:endParaRPr lang="en-US"/>
-          </a:p>
-        </p:txBody>
-      </p:sp>
-    </p:spTree>
-    <p:extLst>
-      <p:ext uri="{BB962C8B-B14F-4D97-AF65-F5344CB8AC3E}">
-        <p14:creationId xmlns:p14="http://schemas.microsoft.com/office/powerpoint/2010/main" val="2431772223"/>
-      </p:ext>
-    </p:extLst>
-  </p:cSld>
-  <p:clrMapOvr>
-    <a:masterClrMapping/>
-  </p:clrMapOvr>
-</p:notes>
-</file>
-
-<file path=ppt/notesSlides/notesSlide7.xml><?xml version="1.0" encoding="utf-8"?>
-<p:notes xmlns:a="http://schemas.openxmlformats.org/drawingml/2006/main" xmlns:r="http://schemas.openxmlformats.org/officeDocument/2006/relationships" xmlns:p="http://schemas.openxmlformats.org/presentationml/2006/main">
-  <p:cSld>
-    <p:spTree>
-      <p:nvGrpSpPr>
-        <p:cNvPr id="1" name=""/>
-        <p:cNvGrpSpPr/>
-        <p:nvPr/>
-      </p:nvGrpSpPr>
-      <p:grpSpPr>
-        <a:xfrm>
-          <a:off x="0" y="0"/>
-          <a:ext cx="0" cy="0"/>
-          <a:chOff x="0" y="0"/>
-          <a:chExt cx="0" cy="0"/>
-        </a:xfrm>
-      </p:grpSpPr>
-      <p:sp>
-        <p:nvSpPr>
-          <p:cNvPr id="2" name="Slide Image Placeholder 1"/>
-          <p:cNvSpPr>
-            <a:spLocks noGrp="1" noRot="1" noChangeAspect="1"/>
-          </p:cNvSpPr>
-          <p:nvPr>
-            <p:ph type="sldImg"/>
-          </p:nvPr>
-        </p:nvSpPr>
-        <p:spPr/>
-      </p:sp>
-      <p:sp>
-        <p:nvSpPr>
-          <p:cNvPr id="3" name="Notes Placeholder 2"/>
-          <p:cNvSpPr>
-            <a:spLocks noGrp="1"/>
-          </p:cNvSpPr>
-          <p:nvPr>
-            <p:ph type="body" idx="1"/>
-          </p:nvPr>
-        </p:nvSpPr>
-        <p:spPr/>
-        <p:txBody>
-          <a:bodyPr/>
-          <a:lstStyle/>
-          <a:p>
-            <a:pPr marL="0" marR="0" lvl="0" indent="0" algn="l" defTabSz="914400" rtl="0" eaLnBrk="1" fontAlgn="auto" latinLnBrk="0" hangingPunct="1">
-              <a:lnSpc>
-                <a:spcPct val="100000"/>
-              </a:lnSpc>
-              <a:spcBef>
-                <a:spcPts val="0"/>
-              </a:spcBef>
-              <a:spcAft>
-                <a:spcPts val="0"/>
-              </a:spcAft>
-              <a:buClrTx/>
-              <a:buSzTx/>
-              <a:buFontTx/>
-              <a:buNone/>
-              <a:tabLst/>
-              <a:defRPr/>
-            </a:pPr>
-            <a:r>
-              <a:rPr lang="en-US" dirty="0"/>
-              <a:t>John </a:t>
-            </a:r>
-            <a:r>
-              <a:rPr lang="en-US" dirty="0" err="1"/>
-              <a:t>Kacher</a:t>
-            </a:r>
-            <a:r>
-              <a:rPr lang="en-US" dirty="0"/>
-              <a:t> Dislocation Glide https://youtu.be/EXbiEopDJ_g</a:t>
-            </a:r>
-          </a:p>
-          <a:p>
-            <a:pPr marL="0" marR="0" lvl="0" indent="0" algn="l" defTabSz="914400" rtl="0" eaLnBrk="1" fontAlgn="auto" latinLnBrk="0" hangingPunct="1">
-              <a:lnSpc>
-                <a:spcPct val="100000"/>
-              </a:lnSpc>
-              <a:spcBef>
-                <a:spcPts val="0"/>
-              </a:spcBef>
-              <a:spcAft>
-                <a:spcPts val="0"/>
-              </a:spcAft>
-              <a:buClrTx/>
-              <a:buSzTx/>
-              <a:buFontTx/>
-              <a:buNone/>
-              <a:tabLst/>
-              <a:defRPr/>
-            </a:pPr>
-            <a:endParaRPr lang="en-US" dirty="0"/>
-          </a:p>
-          <a:p>
-            <a:pPr marL="0" marR="0" lvl="0" indent="0" algn="l" defTabSz="914400" rtl="0" eaLnBrk="1" fontAlgn="auto" latinLnBrk="0" hangingPunct="1">
-              <a:lnSpc>
-                <a:spcPct val="100000"/>
-              </a:lnSpc>
-              <a:spcBef>
-                <a:spcPts val="0"/>
-              </a:spcBef>
-              <a:spcAft>
-                <a:spcPts val="0"/>
-              </a:spcAft>
-              <a:buClrTx/>
-              <a:buSzTx/>
-              <a:buFontTx/>
-              <a:buNone/>
-              <a:tabLst/>
-              <a:defRPr/>
-            </a:pPr>
-            <a:r>
-              <a:rPr lang="en-US" dirty="0"/>
-              <a:t>Excerpt from a longer film on bubble rafts, possibly made in the 1940s by William Lawrence Bragg. https://youtu.be/P345p7A4IW8 </a:t>
-            </a:r>
-          </a:p>
-          <a:p>
-            <a:pPr marL="0" marR="0" lvl="0" indent="0" algn="l" defTabSz="914400" rtl="0" eaLnBrk="1" fontAlgn="auto" latinLnBrk="0" hangingPunct="1">
-              <a:lnSpc>
-                <a:spcPct val="100000"/>
-              </a:lnSpc>
-              <a:spcBef>
-                <a:spcPts val="0"/>
-              </a:spcBef>
-              <a:spcAft>
-                <a:spcPts val="0"/>
-              </a:spcAft>
-              <a:buClrTx/>
-              <a:buSzTx/>
-              <a:buFontTx/>
-              <a:buNone/>
-              <a:tabLst/>
-              <a:defRPr/>
-            </a:pPr>
-            <a:r>
-              <a:rPr lang="en-US" dirty="0"/>
-              <a:t> </a:t>
-            </a:r>
-          </a:p>
-          <a:p>
-            <a:endParaRPr lang="en-US" dirty="0"/>
-          </a:p>
-        </p:txBody>
-      </p:sp>
-      <p:sp>
-        <p:nvSpPr>
-          <p:cNvPr id="4" name="Slide Number Placeholder 3"/>
-          <p:cNvSpPr>
-            <a:spLocks noGrp="1"/>
-          </p:cNvSpPr>
-          <p:nvPr>
-            <p:ph type="sldNum" sz="quarter" idx="5"/>
-          </p:nvPr>
-        </p:nvSpPr>
-        <p:spPr/>
-        <p:txBody>
-          <a:bodyPr/>
-          <a:lstStyle/>
-          <a:p>
-            <a:fld id="{827965A8-693C-4A5A-A2C9-39477FD733AE}" type="slidenum">
-              <a:rPr lang="en-US" smtClean="0"/>
-              <a:pPr/>
-              <a:t>10</a:t>
-            </a:fld>
-            <a:endParaRPr lang="en-US"/>
-          </a:p>
-        </p:txBody>
-      </p:sp>
-    </p:spTree>
-    <p:extLst>
-      <p:ext uri="{BB962C8B-B14F-4D97-AF65-F5344CB8AC3E}">
-        <p14:creationId xmlns:p14="http://schemas.microsoft.com/office/powerpoint/2010/main" val="1181028497"/>
-      </p:ext>
-    </p:extLst>
-  </p:cSld>
-  <p:clrMapOvr>
-    <a:masterClrMapping/>
-  </p:clrMapOvr>
-</p:notes>
-</file>
-
-<file path=ppt/notesSlides/notesSlide8.xml><?xml version="1.0" encoding="utf-8"?>
-<p:notes xmlns:a="http://schemas.openxmlformats.org/drawingml/2006/main" xmlns:r="http://schemas.openxmlformats.org/officeDocument/2006/relationships" xmlns:p="http://schemas.openxmlformats.org/presentationml/2006/main">
-  <p:cSld>
-    <p:spTree>
-      <p:nvGrpSpPr>
-        <p:cNvPr id="1" name=""/>
-        <p:cNvGrpSpPr/>
-        <p:nvPr/>
-      </p:nvGrpSpPr>
-      <p:grpSpPr>
-        <a:xfrm>
-          <a:off x="0" y="0"/>
-          <a:ext cx="0" cy="0"/>
-          <a:chOff x="0" y="0"/>
-          <a:chExt cx="0" cy="0"/>
-        </a:xfrm>
-      </p:grpSpPr>
-      <p:sp>
-        <p:nvSpPr>
-          <p:cNvPr id="2" name="Slide Image Placeholder 1"/>
-          <p:cNvSpPr>
-            <a:spLocks noGrp="1" noRot="1" noChangeAspect="1"/>
-          </p:cNvSpPr>
-          <p:nvPr>
-            <p:ph type="sldImg"/>
-          </p:nvPr>
-        </p:nvSpPr>
-        <p:spPr/>
-      </p:sp>
-      <p:sp>
-        <p:nvSpPr>
-          <p:cNvPr id="3" name="Notes Placeholder 2"/>
-          <p:cNvSpPr>
-            <a:spLocks noGrp="1"/>
-          </p:cNvSpPr>
-          <p:nvPr>
-            <p:ph type="body" idx="1"/>
-          </p:nvPr>
-        </p:nvSpPr>
-        <p:spPr/>
-        <p:txBody>
-          <a:bodyPr/>
-          <a:lstStyle/>
-          <a:p>
-            <a:pPr marL="0" marR="0" lvl="0" indent="0" algn="l" defTabSz="914400" rtl="0" eaLnBrk="1" fontAlgn="auto" latinLnBrk="0" hangingPunct="1">
-              <a:lnSpc>
-                <a:spcPct val="100000"/>
-              </a:lnSpc>
-              <a:spcBef>
-                <a:spcPts val="0"/>
-              </a:spcBef>
-              <a:spcAft>
-                <a:spcPts val="0"/>
-              </a:spcAft>
-              <a:buClrTx/>
-              <a:buSzTx/>
-              <a:buFontTx/>
-              <a:buNone/>
-              <a:tabLst/>
-              <a:defRPr/>
-            </a:pPr>
-            <a:r>
-              <a:rPr lang="en-US" dirty="0"/>
-              <a:t>John </a:t>
-            </a:r>
-            <a:r>
-              <a:rPr lang="en-US" dirty="0" err="1"/>
-              <a:t>Kacher</a:t>
-            </a:r>
-            <a:r>
-              <a:rPr lang="en-US" dirty="0"/>
-              <a:t> Dislocation Glide https://youtu.be/EXbiEopDJ_g</a:t>
-            </a:r>
-          </a:p>
-          <a:p>
-            <a:pPr marL="0" marR="0" lvl="0" indent="0" algn="l" defTabSz="914400" rtl="0" eaLnBrk="1" fontAlgn="auto" latinLnBrk="0" hangingPunct="1">
-              <a:lnSpc>
-                <a:spcPct val="100000"/>
-              </a:lnSpc>
-              <a:spcBef>
-                <a:spcPts val="0"/>
-              </a:spcBef>
-              <a:spcAft>
-                <a:spcPts val="0"/>
-              </a:spcAft>
-              <a:buClrTx/>
-              <a:buSzTx/>
-              <a:buFontTx/>
-              <a:buNone/>
-              <a:tabLst/>
-              <a:defRPr/>
-            </a:pPr>
-            <a:endParaRPr lang="en-US" dirty="0"/>
-          </a:p>
-          <a:p>
-            <a:pPr marL="0" marR="0" lvl="0" indent="0" algn="l" defTabSz="914400" rtl="0" eaLnBrk="1" fontAlgn="auto" latinLnBrk="0" hangingPunct="1">
-              <a:lnSpc>
-                <a:spcPct val="100000"/>
-              </a:lnSpc>
-              <a:spcBef>
-                <a:spcPts val="0"/>
-              </a:spcBef>
-              <a:spcAft>
-                <a:spcPts val="0"/>
-              </a:spcAft>
-              <a:buClrTx/>
-              <a:buSzTx/>
-              <a:buFontTx/>
-              <a:buNone/>
-              <a:tabLst/>
-              <a:defRPr/>
-            </a:pPr>
-            <a:r>
-              <a:rPr lang="en-US" dirty="0"/>
-              <a:t>Excerpt from a longer film on bubble rafts, possibly made in the 1940s by William Lawrence Bragg. https://youtu.be/P345p7A4IW8 </a:t>
-            </a:r>
-          </a:p>
-          <a:p>
-            <a:pPr marL="0" marR="0" lvl="0" indent="0" algn="l" defTabSz="914400" rtl="0" eaLnBrk="1" fontAlgn="auto" latinLnBrk="0" hangingPunct="1">
-              <a:lnSpc>
-                <a:spcPct val="100000"/>
-              </a:lnSpc>
-              <a:spcBef>
-                <a:spcPts val="0"/>
-              </a:spcBef>
-              <a:spcAft>
-                <a:spcPts val="0"/>
-              </a:spcAft>
-              <a:buClrTx/>
-              <a:buSzTx/>
-              <a:buFontTx/>
-              <a:buNone/>
-              <a:tabLst/>
-              <a:defRPr/>
-            </a:pPr>
-            <a:r>
-              <a:rPr lang="en-US" dirty="0"/>
-              <a:t> </a:t>
-            </a:r>
-          </a:p>
-          <a:p>
-            <a:endParaRPr lang="en-US" dirty="0"/>
-          </a:p>
-        </p:txBody>
-      </p:sp>
-      <p:sp>
-        <p:nvSpPr>
-          <p:cNvPr id="4" name="Slide Number Placeholder 3"/>
-          <p:cNvSpPr>
-            <a:spLocks noGrp="1"/>
-          </p:cNvSpPr>
-          <p:nvPr>
-            <p:ph type="sldNum" sz="quarter" idx="5"/>
-          </p:nvPr>
-        </p:nvSpPr>
-        <p:spPr/>
-        <p:txBody>
-          <a:bodyPr/>
-          <a:lstStyle/>
-          <a:p>
-            <a:fld id="{827965A8-693C-4A5A-A2C9-39477FD733AE}" type="slidenum">
-              <a:rPr lang="en-US" smtClean="0"/>
-              <a:pPr/>
-              <a:t>11</a:t>
-            </a:fld>
-            <a:endParaRPr lang="en-US"/>
-          </a:p>
-        </p:txBody>
-      </p:sp>
-    </p:spTree>
-    <p:extLst>
-      <p:ext uri="{BB962C8B-B14F-4D97-AF65-F5344CB8AC3E}">
-        <p14:creationId xmlns:p14="http://schemas.microsoft.com/office/powerpoint/2010/main" val="3746776220"/>
       </p:ext>
     </p:extLst>
   </p:cSld>
@@ -5901,1506 +5139,6 @@
       </p:par>
     </p:tnLst>
   </p:timing>
-</p:sld>
-</file>
-
-<file path=ppt/slides/slide10.xml><?xml version="1.0" encoding="utf-8"?>
-<p:sld xmlns:a="http://schemas.openxmlformats.org/drawingml/2006/main" xmlns:r="http://schemas.openxmlformats.org/officeDocument/2006/relationships" xmlns:p="http://schemas.openxmlformats.org/presentationml/2006/main">
-  <p:cSld>
-    <p:bg>
-      <p:bgPr>
-        <a:solidFill>
-          <a:schemeClr val="bg1"/>
-        </a:solidFill>
-        <a:effectLst/>
-      </p:bgPr>
-    </p:bg>
-    <p:spTree>
-      <p:nvGrpSpPr>
-        <p:cNvPr id="1" name=""/>
-        <p:cNvGrpSpPr/>
-        <p:nvPr/>
-      </p:nvGrpSpPr>
-      <p:grpSpPr>
-        <a:xfrm>
-          <a:off x="0" y="0"/>
-          <a:ext cx="0" cy="0"/>
-          <a:chOff x="0" y="0"/>
-          <a:chExt cx="0" cy="0"/>
-        </a:xfrm>
-      </p:grpSpPr>
-      <p:sp>
-        <p:nvSpPr>
-          <p:cNvPr id="34" name="Rectangle 12">
-            <a:extLst>
-              <a:ext uri="{FF2B5EF4-FFF2-40B4-BE49-F238E27FC236}">
-                <a16:creationId xmlns:a16="http://schemas.microsoft.com/office/drawing/2014/main" id="{6F79B0DD-2C63-4EE5-804F-B8E391FC1E45}"/>
-              </a:ext>
-              <a:ext uri="{C183D7F6-B498-43B3-948B-1728B52AA6E4}">
-                <adec:decorative xmlns:adec="http://schemas.microsoft.com/office/drawing/2017/decorative" val="1"/>
-              </a:ext>
-            </a:extLst>
-          </p:cNvPr>
-          <p:cNvSpPr>
-            <a:spLocks noGrp="1" noRot="1" noChangeAspect="1" noMove="1" noResize="1" noEditPoints="1" noAdjustHandles="1" noChangeArrowheads="1" noChangeShapeType="1" noTextEdit="1"/>
-          </p:cNvSpPr>
-          <p:nvPr>
-            <p:extLst>
-              <p:ext uri="{386F3935-93C4-4BCD-93E2-E3B085C9AB24}">
-                <p16:designElem xmlns:p16="http://schemas.microsoft.com/office/powerpoint/2015/main" val="1"/>
-              </p:ext>
-            </p:extLst>
-          </p:nvPr>
-        </p:nvSpPr>
-        <p:spPr>
-          <a:xfrm>
-            <a:off x="2352" y="0"/>
-            <a:ext cx="9144000" cy="6858000"/>
-          </a:xfrm>
-          <a:prstGeom prst="rect">
-            <a:avLst/>
-          </a:prstGeom>
-          <a:solidFill>
-            <a:schemeClr val="bg1">
-              <a:lumMod val="75000"/>
-              <a:alpha val="80000"/>
-            </a:schemeClr>
-          </a:solidFill>
-          <a:ln>
-            <a:noFill/>
-          </a:ln>
-        </p:spPr>
-        <p:style>
-          <a:lnRef idx="2">
-            <a:schemeClr val="accent1">
-              <a:shade val="50000"/>
-            </a:schemeClr>
-          </a:lnRef>
-          <a:fillRef idx="1">
-            <a:schemeClr val="accent1"/>
-          </a:fillRef>
-          <a:effectRef idx="0">
-            <a:schemeClr val="accent1"/>
-          </a:effectRef>
-          <a:fontRef idx="minor">
-            <a:schemeClr val="lt1"/>
-          </a:fontRef>
-        </p:style>
-        <p:txBody>
-          <a:bodyPr rtlCol="0" anchor="ctr"/>
-          <a:lstStyle/>
-          <a:p>
-            <a:pPr algn="ctr"/>
-            <a:endParaRPr lang="en-US"/>
-          </a:p>
-        </p:txBody>
-      </p:sp>
-      <p:sp>
-        <p:nvSpPr>
-          <p:cNvPr id="35" name="Rectangle 14">
-            <a:extLst>
-              <a:ext uri="{FF2B5EF4-FFF2-40B4-BE49-F238E27FC236}">
-                <a16:creationId xmlns:a16="http://schemas.microsoft.com/office/drawing/2014/main" id="{627DB8AB-CD55-4C8F-9043-52652B89231A}"/>
-              </a:ext>
-              <a:ext uri="{C183D7F6-B498-43B3-948B-1728B52AA6E4}">
-                <adec:decorative xmlns:adec="http://schemas.microsoft.com/office/drawing/2017/decorative" val="1"/>
-              </a:ext>
-            </a:extLst>
-          </p:cNvPr>
-          <p:cNvSpPr>
-            <a:spLocks noGrp="1" noRot="1" noChangeAspect="1" noMove="1" noResize="1" noEditPoints="1" noAdjustHandles="1" noChangeArrowheads="1" noChangeShapeType="1" noTextEdit="1"/>
-          </p:cNvSpPr>
-          <p:nvPr>
-            <p:extLst>
-              <p:ext uri="{386F3935-93C4-4BCD-93E2-E3B085C9AB24}">
-                <p16:designElem xmlns:p16="http://schemas.microsoft.com/office/powerpoint/2015/main" val="1"/>
-              </p:ext>
-            </p:extLst>
-          </p:nvPr>
-        </p:nvSpPr>
-        <p:spPr>
-          <a:xfrm>
-            <a:off x="482599" y="643466"/>
-            <a:ext cx="4023191" cy="2706794"/>
-          </a:xfrm>
-          <a:prstGeom prst="rect">
-            <a:avLst/>
-          </a:prstGeom>
-          <a:solidFill>
-            <a:srgbClr val="FFFFFF"/>
-          </a:solidFill>
-          <a:ln w="9525">
-            <a:noFill/>
-          </a:ln>
-          <a:effectLst>
-            <a:outerShdw blurRad="63500" dist="17780" dir="5400000" algn="t" rotWithShape="0">
-              <a:prstClr val="black">
-                <a:alpha val="43000"/>
-              </a:prstClr>
-            </a:outerShdw>
-          </a:effectLst>
-        </p:spPr>
-        <p:style>
-          <a:lnRef idx="2">
-            <a:schemeClr val="accent1">
-              <a:shade val="50000"/>
-            </a:schemeClr>
-          </a:lnRef>
-          <a:fillRef idx="1">
-            <a:schemeClr val="accent1"/>
-          </a:fillRef>
-          <a:effectRef idx="0">
-            <a:schemeClr val="accent1"/>
-          </a:effectRef>
-          <a:fontRef idx="minor">
-            <a:schemeClr val="lt1"/>
-          </a:fontRef>
-        </p:style>
-        <p:txBody>
-          <a:bodyPr rtlCol="0" anchor="ctr"/>
-          <a:lstStyle/>
-          <a:p>
-            <a:pPr algn="ctr"/>
-            <a:endParaRPr lang="en-US"/>
-          </a:p>
-        </p:txBody>
-      </p:sp>
-      <p:sp>
-        <p:nvSpPr>
-          <p:cNvPr id="36" name="Rectangle 16">
-            <a:extLst>
-              <a:ext uri="{FF2B5EF4-FFF2-40B4-BE49-F238E27FC236}">
-                <a16:creationId xmlns:a16="http://schemas.microsoft.com/office/drawing/2014/main" id="{53059C5A-91CB-4024-9B4E-20082E25C70B}"/>
-              </a:ext>
-              <a:ext uri="{C183D7F6-B498-43B3-948B-1728B52AA6E4}">
-                <adec:decorative xmlns:adec="http://schemas.microsoft.com/office/drawing/2017/decorative" val="1"/>
-              </a:ext>
-            </a:extLst>
-          </p:cNvPr>
-          <p:cNvSpPr>
-            <a:spLocks noGrp="1" noRot="1" noChangeAspect="1" noMove="1" noResize="1" noEditPoints="1" noAdjustHandles="1" noChangeArrowheads="1" noChangeShapeType="1" noTextEdit="1"/>
-          </p:cNvSpPr>
-          <p:nvPr>
-            <p:extLst>
-              <p:ext uri="{386F3935-93C4-4BCD-93E2-E3B085C9AB24}">
-                <p16:designElem xmlns:p16="http://schemas.microsoft.com/office/powerpoint/2015/main" val="1"/>
-              </p:ext>
-            </p:extLst>
-          </p:nvPr>
-        </p:nvSpPr>
-        <p:spPr>
-          <a:xfrm>
-            <a:off x="4626441" y="643466"/>
-            <a:ext cx="4032605" cy="2706794"/>
-          </a:xfrm>
-          <a:prstGeom prst="rect">
-            <a:avLst/>
-          </a:prstGeom>
-          <a:solidFill>
-            <a:srgbClr val="FFFFFF"/>
-          </a:solidFill>
-          <a:ln w="9525">
-            <a:noFill/>
-          </a:ln>
-          <a:effectLst>
-            <a:outerShdw blurRad="63500" dist="17780" dir="5400000" algn="t" rotWithShape="0">
-              <a:prstClr val="black">
-                <a:alpha val="43000"/>
-              </a:prstClr>
-            </a:outerShdw>
-          </a:effectLst>
-        </p:spPr>
-        <p:style>
-          <a:lnRef idx="2">
-            <a:schemeClr val="accent1">
-              <a:shade val="50000"/>
-            </a:schemeClr>
-          </a:lnRef>
-          <a:fillRef idx="1">
-            <a:schemeClr val="accent1"/>
-          </a:fillRef>
-          <a:effectRef idx="0">
-            <a:schemeClr val="accent1"/>
-          </a:effectRef>
-          <a:fontRef idx="minor">
-            <a:schemeClr val="lt1"/>
-          </a:fontRef>
-        </p:style>
-        <p:txBody>
-          <a:bodyPr rtlCol="0" anchor="ctr"/>
-          <a:lstStyle/>
-          <a:p>
-            <a:pPr algn="ctr"/>
-            <a:endParaRPr lang="en-US"/>
-          </a:p>
-        </p:txBody>
-      </p:sp>
-      <p:pic>
-        <p:nvPicPr>
-          <p:cNvPr id="7" name="TheoreticalStrength.mpg">
-            <a:hlinkClick r:id="" action="ppaction://media"/>
-            <a:extLst>
-              <a:ext uri="{FF2B5EF4-FFF2-40B4-BE49-F238E27FC236}">
-                <a16:creationId xmlns:a16="http://schemas.microsoft.com/office/drawing/2014/main" id="{D00487CB-E47C-496B-A767-4E667BC60CB3}"/>
-              </a:ext>
-            </a:extLst>
-          </p:cNvPr>
-          <p:cNvPicPr>
-            <a:picLocks noChangeAspect="1"/>
-          </p:cNvPicPr>
-          <p:nvPr>
-            <a:videoFile r:link="rId2"/>
-            <p:extLst>
-              <p:ext uri="{DAA4B4D4-6D71-4841-9C94-3DE7FCFB9230}">
-                <p14:media xmlns:p14="http://schemas.microsoft.com/office/powerpoint/2010/main" r:embed="rId1"/>
-              </p:ext>
-            </p:extLst>
-          </p:nvPr>
-        </p:nvPicPr>
-        <p:blipFill rotWithShape="1">
-          <a:blip r:embed="rId9" cstate="print"/>
-          <a:srcRect l="6266" t="11186" r="2689" b="17177"/>
-          <a:stretch/>
-        </p:blipFill>
-        <p:spPr>
-          <a:xfrm>
-            <a:off x="893756" y="966713"/>
-            <a:ext cx="3200400" cy="2060298"/>
-          </a:xfrm>
-          <a:prstGeom prst="rect">
-            <a:avLst/>
-          </a:prstGeom>
-        </p:spPr>
-      </p:pic>
-      <p:sp>
-        <p:nvSpPr>
-          <p:cNvPr id="37" name="Rectangle 18">
-            <a:extLst>
-              <a:ext uri="{FF2B5EF4-FFF2-40B4-BE49-F238E27FC236}">
-                <a16:creationId xmlns:a16="http://schemas.microsoft.com/office/drawing/2014/main" id="{184884BF-A898-4EFF-9504-E13EBE3FF62E}"/>
-              </a:ext>
-              <a:ext uri="{C183D7F6-B498-43B3-948B-1728B52AA6E4}">
-                <adec:decorative xmlns:adec="http://schemas.microsoft.com/office/drawing/2017/decorative" val="1"/>
-              </a:ext>
-            </a:extLst>
-          </p:cNvPr>
-          <p:cNvSpPr>
-            <a:spLocks noGrp="1" noRot="1" noChangeAspect="1" noMove="1" noResize="1" noEditPoints="1" noAdjustHandles="1" noChangeArrowheads="1" noChangeShapeType="1" noTextEdit="1"/>
-          </p:cNvSpPr>
-          <p:nvPr>
-            <p:extLst>
-              <p:ext uri="{386F3935-93C4-4BCD-93E2-E3B085C9AB24}">
-                <p16:designElem xmlns:p16="http://schemas.microsoft.com/office/powerpoint/2015/main" val="1"/>
-              </p:ext>
-            </p:extLst>
-          </p:nvPr>
-        </p:nvSpPr>
-        <p:spPr>
-          <a:xfrm>
-            <a:off x="482599" y="3514513"/>
-            <a:ext cx="4023191" cy="2703406"/>
-          </a:xfrm>
-          <a:prstGeom prst="rect">
-            <a:avLst/>
-          </a:prstGeom>
-          <a:solidFill>
-            <a:srgbClr val="FFFFFF"/>
-          </a:solidFill>
-          <a:ln w="9525">
-            <a:noFill/>
-          </a:ln>
-          <a:effectLst>
-            <a:outerShdw blurRad="63500" dist="17780" dir="5400000" algn="t" rotWithShape="0">
-              <a:prstClr val="black">
-                <a:alpha val="43000"/>
-              </a:prstClr>
-            </a:outerShdw>
-          </a:effectLst>
-        </p:spPr>
-        <p:style>
-          <a:lnRef idx="2">
-            <a:schemeClr val="accent1">
-              <a:shade val="50000"/>
-            </a:schemeClr>
-          </a:lnRef>
-          <a:fillRef idx="1">
-            <a:schemeClr val="accent1"/>
-          </a:fillRef>
-          <a:effectRef idx="0">
-            <a:schemeClr val="accent1"/>
-          </a:effectRef>
-          <a:fontRef idx="minor">
-            <a:schemeClr val="lt1"/>
-          </a:fontRef>
-        </p:style>
-        <p:txBody>
-          <a:bodyPr rtlCol="0" anchor="ctr"/>
-          <a:lstStyle/>
-          <a:p>
-            <a:pPr algn="ctr"/>
-            <a:endParaRPr lang="en-US"/>
-          </a:p>
-        </p:txBody>
-      </p:sp>
-      <p:sp>
-        <p:nvSpPr>
-          <p:cNvPr id="38" name="Rectangle 20">
-            <a:extLst>
-              <a:ext uri="{FF2B5EF4-FFF2-40B4-BE49-F238E27FC236}">
-                <a16:creationId xmlns:a16="http://schemas.microsoft.com/office/drawing/2014/main" id="{7B32D337-FDA6-4468-ADB1-7038E5FC0BA9}"/>
-              </a:ext>
-              <a:ext uri="{C183D7F6-B498-43B3-948B-1728B52AA6E4}">
-                <adec:decorative xmlns:adec="http://schemas.microsoft.com/office/drawing/2017/decorative" val="1"/>
-              </a:ext>
-            </a:extLst>
-          </p:cNvPr>
-          <p:cNvSpPr>
-            <a:spLocks noGrp="1" noRot="1" noChangeAspect="1" noMove="1" noResize="1" noEditPoints="1" noAdjustHandles="1" noChangeArrowheads="1" noChangeShapeType="1" noTextEdit="1"/>
-          </p:cNvSpPr>
-          <p:nvPr>
-            <p:extLst>
-              <p:ext uri="{386F3935-93C4-4BCD-93E2-E3B085C9AB24}">
-                <p16:designElem xmlns:p16="http://schemas.microsoft.com/office/powerpoint/2015/main" val="1"/>
-              </p:ext>
-            </p:extLst>
-          </p:nvPr>
-        </p:nvSpPr>
-        <p:spPr>
-          <a:xfrm>
-            <a:off x="4626441" y="3514513"/>
-            <a:ext cx="4032605" cy="2706794"/>
-          </a:xfrm>
-          <a:prstGeom prst="rect">
-            <a:avLst/>
-          </a:prstGeom>
-          <a:solidFill>
-            <a:srgbClr val="FFFFFF"/>
-          </a:solidFill>
-          <a:ln w="9525">
-            <a:noFill/>
-          </a:ln>
-          <a:effectLst>
-            <a:outerShdw blurRad="63500" dist="17780" dir="5400000" algn="t" rotWithShape="0">
-              <a:prstClr val="black">
-                <a:alpha val="43000"/>
-              </a:prstClr>
-            </a:outerShdw>
-          </a:effectLst>
-        </p:spPr>
-        <p:style>
-          <a:lnRef idx="2">
-            <a:schemeClr val="accent1">
-              <a:shade val="50000"/>
-            </a:schemeClr>
-          </a:lnRef>
-          <a:fillRef idx="1">
-            <a:schemeClr val="accent1"/>
-          </a:fillRef>
-          <a:effectRef idx="0">
-            <a:schemeClr val="accent1"/>
-          </a:effectRef>
-          <a:fontRef idx="minor">
-            <a:schemeClr val="lt1"/>
-          </a:fontRef>
-        </p:style>
-        <p:txBody>
-          <a:bodyPr rtlCol="0" anchor="ctr"/>
-          <a:lstStyle/>
-          <a:p>
-            <a:pPr algn="ctr"/>
-            <a:endParaRPr lang="en-US"/>
-          </a:p>
-        </p:txBody>
-      </p:sp>
-      <p:pic>
-        <p:nvPicPr>
-          <p:cNvPr id="8" name="edge under shear.mpg">
-            <a:hlinkClick r:id="" action="ppaction://media"/>
-            <a:extLst>
-              <a:ext uri="{FF2B5EF4-FFF2-40B4-BE49-F238E27FC236}">
-                <a16:creationId xmlns:a16="http://schemas.microsoft.com/office/drawing/2014/main" id="{0C0F8B3E-54AA-4F60-BB26-FDE496C6343C}"/>
-              </a:ext>
-            </a:extLst>
-          </p:cNvPr>
-          <p:cNvPicPr>
-            <a:picLocks noChangeAspect="1"/>
-          </p:cNvPicPr>
-          <p:nvPr>
-            <a:videoFile r:link="rId4"/>
-            <p:extLst>
-              <p:ext uri="{DAA4B4D4-6D71-4841-9C94-3DE7FCFB9230}">
-                <p14:media xmlns:p14="http://schemas.microsoft.com/office/powerpoint/2010/main" r:embed="rId3"/>
-              </p:ext>
-            </p:extLst>
-          </p:nvPr>
-        </p:nvPicPr>
-        <p:blipFill>
-          <a:blip r:embed="rId10" cstate="print"/>
-          <a:stretch>
-            <a:fillRect/>
-          </a:stretch>
-        </p:blipFill>
-        <p:spPr>
-          <a:xfrm>
-            <a:off x="5272612" y="831710"/>
-            <a:ext cx="2848151" cy="2330305"/>
-          </a:xfrm>
-          <a:prstGeom prst="rect">
-            <a:avLst/>
-          </a:prstGeom>
-        </p:spPr>
-      </p:pic>
-      <p:pic>
-        <p:nvPicPr>
-          <p:cNvPr id="4" name="Online Media 1" title="Bubble Raft Model - part 1">
-            <a:hlinkClick r:id="" action="ppaction://media"/>
-            <a:extLst>
-              <a:ext uri="{FF2B5EF4-FFF2-40B4-BE49-F238E27FC236}">
-                <a16:creationId xmlns:a16="http://schemas.microsoft.com/office/drawing/2014/main" id="{7C9C8180-0FA4-4A6A-818D-07E82D35ED37}"/>
-              </a:ext>
-            </a:extLst>
-          </p:cNvPr>
-          <p:cNvPicPr>
-            <a:picLocks noRot="1" noChangeAspect="1"/>
-          </p:cNvPicPr>
-          <p:nvPr>
-            <a:videoFile r:link="rId5"/>
-          </p:nvPr>
-        </p:nvPicPr>
-        <p:blipFill>
-          <a:blip r:embed="rId11"/>
-          <a:stretch>
-            <a:fillRect/>
-          </a:stretch>
-        </p:blipFill>
-        <p:spPr>
-          <a:xfrm>
-            <a:off x="1120424" y="3859205"/>
-            <a:ext cx="2716213" cy="2037160"/>
-          </a:xfrm>
-          <a:prstGeom prst="rect">
-            <a:avLst/>
-          </a:prstGeom>
-        </p:spPr>
-      </p:pic>
-      <p:pic>
-        <p:nvPicPr>
-          <p:cNvPr id="2" name="Online Media 1" title="Dislocation glide">
-            <a:hlinkClick r:id="" action="ppaction://media"/>
-            <a:extLst>
-              <a:ext uri="{FF2B5EF4-FFF2-40B4-BE49-F238E27FC236}">
-                <a16:creationId xmlns:a16="http://schemas.microsoft.com/office/drawing/2014/main" id="{4BE029CA-7D88-4D8C-AEBA-DC117C83BE0C}"/>
-              </a:ext>
-            </a:extLst>
-          </p:cNvPr>
-          <p:cNvPicPr>
-            <a:picLocks noRot="1" noChangeAspect="1"/>
-          </p:cNvPicPr>
-          <p:nvPr>
-            <a:videoFile r:link="rId6"/>
-          </p:nvPr>
-        </p:nvPicPr>
-        <p:blipFill>
-          <a:blip r:embed="rId12"/>
-          <a:stretch>
-            <a:fillRect/>
-          </a:stretch>
-        </p:blipFill>
-        <p:spPr>
-          <a:xfrm>
-            <a:off x="1905000" y="1335898"/>
-            <a:ext cx="6111473" cy="4583605"/>
-          </a:xfrm>
-          <a:prstGeom prst="rect">
-            <a:avLst/>
-          </a:prstGeom>
-        </p:spPr>
-      </p:pic>
-    </p:spTree>
-    <p:extLst>
-      <p:ext uri="{BB962C8B-B14F-4D97-AF65-F5344CB8AC3E}">
-        <p14:creationId xmlns:p14="http://schemas.microsoft.com/office/powerpoint/2010/main" val="1507353024"/>
-      </p:ext>
-    </p:extLst>
-  </p:cSld>
-  <p:clrMapOvr>
-    <a:masterClrMapping/>
-  </p:clrMapOvr>
-  <mc:AlternateContent xmlns:mc="http://schemas.openxmlformats.org/markup-compatibility/2006" xmlns:p159="http://schemas.microsoft.com/office/powerpoint/2015/09/main">
-    <mc:Choice Requires="p159">
-      <p:transition xmlns:p14="http://schemas.microsoft.com/office/powerpoint/2010/main" spd="slow" p14:dur="2000">
-        <p159:morph option="byObject"/>
-      </p:transition>
-    </mc:Choice>
-    <mc:Fallback xmlns="">
-      <p:transition spd="slow">
-        <p:fade/>
-      </p:transition>
-    </mc:Fallback>
-  </mc:AlternateContent>
-  <p:timing>
-    <p:tnLst>
-      <p:par>
-        <p:cTn id="1" dur="indefinite" restart="never" nodeType="tmRoot">
-          <p:childTnLst>
-            <p:video>
-              <p:cMediaNode vol="80000">
-                <p:cTn id="2" fill="hold" display="0">
-                  <p:stCondLst>
-                    <p:cond delay="indefinite"/>
-                  </p:stCondLst>
-                </p:cTn>
-                <p:tgtEl>
-                  <p:spTgt spid="2"/>
-                </p:tgtEl>
-              </p:cMediaNode>
-            </p:video>
-            <p:video>
-              <p:cMediaNode vol="80000">
-                <p:cTn id="3" fill="hold" display="0">
-                  <p:stCondLst>
-                    <p:cond delay="indefinite"/>
-                  </p:stCondLst>
-                </p:cTn>
-                <p:tgtEl>
-                  <p:spTgt spid="4"/>
-                </p:tgtEl>
-              </p:cMediaNode>
-            </p:video>
-            <p:video>
-              <p:cMediaNode>
-                <p:cTn id="4" fill="hold" display="0">
-                  <p:stCondLst>
-                    <p:cond delay="indefinite"/>
-                  </p:stCondLst>
-                  <p:endCondLst>
-                    <p:cond evt="onNext" delay="0">
-                      <p:tgtEl>
-                        <p:sldTgt/>
-                      </p:tgtEl>
-                    </p:cond>
-                    <p:cond evt="onPrev" delay="0">
-                      <p:tgtEl>
-                        <p:sldTgt/>
-                      </p:tgtEl>
-                    </p:cond>
-                  </p:endCondLst>
-                </p:cTn>
-                <p:tgtEl>
-                  <p:spTgt spid="7"/>
-                </p:tgtEl>
-              </p:cMediaNode>
-            </p:video>
-            <p:video>
-              <p:cMediaNode>
-                <p:cTn id="5" fill="hold" display="0">
-                  <p:stCondLst>
-                    <p:cond delay="indefinite"/>
-                  </p:stCondLst>
-                  <p:endCondLst>
-                    <p:cond evt="onNext" delay="0">
-                      <p:tgtEl>
-                        <p:sldTgt/>
-                      </p:tgtEl>
-                    </p:cond>
-                    <p:cond evt="onPrev" delay="0">
-                      <p:tgtEl>
-                        <p:sldTgt/>
-                      </p:tgtEl>
-                    </p:cond>
-                  </p:endCondLst>
-                </p:cTn>
-                <p:tgtEl>
-                  <p:spTgt spid="8"/>
-                </p:tgtEl>
-              </p:cMediaNode>
-            </p:video>
-          </p:childTnLst>
-        </p:cTn>
-      </p:par>
-    </p:tnLst>
-  </p:timing>
-</p:sld>
-</file>
-
-<file path=ppt/slides/slide11.xml><?xml version="1.0" encoding="utf-8"?>
-<p:sld xmlns:a="http://schemas.openxmlformats.org/drawingml/2006/main" xmlns:r="http://schemas.openxmlformats.org/officeDocument/2006/relationships" xmlns:p="http://schemas.openxmlformats.org/presentationml/2006/main">
-  <p:cSld>
-    <p:bg>
-      <p:bgPr>
-        <a:solidFill>
-          <a:schemeClr val="bg1"/>
-        </a:solidFill>
-        <a:effectLst/>
-      </p:bgPr>
-    </p:bg>
-    <p:spTree>
-      <p:nvGrpSpPr>
-        <p:cNvPr id="1" name=""/>
-        <p:cNvGrpSpPr/>
-        <p:nvPr/>
-      </p:nvGrpSpPr>
-      <p:grpSpPr>
-        <a:xfrm>
-          <a:off x="0" y="0"/>
-          <a:ext cx="0" cy="0"/>
-          <a:chOff x="0" y="0"/>
-          <a:chExt cx="0" cy="0"/>
-        </a:xfrm>
-      </p:grpSpPr>
-      <p:sp>
-        <p:nvSpPr>
-          <p:cNvPr id="34" name="Rectangle 12">
-            <a:extLst>
-              <a:ext uri="{FF2B5EF4-FFF2-40B4-BE49-F238E27FC236}">
-                <a16:creationId xmlns:a16="http://schemas.microsoft.com/office/drawing/2014/main" id="{6F79B0DD-2C63-4EE5-804F-B8E391FC1E45}"/>
-              </a:ext>
-              <a:ext uri="{C183D7F6-B498-43B3-948B-1728B52AA6E4}">
-                <adec:decorative xmlns:adec="http://schemas.microsoft.com/office/drawing/2017/decorative" val="1"/>
-              </a:ext>
-            </a:extLst>
-          </p:cNvPr>
-          <p:cNvSpPr>
-            <a:spLocks noGrp="1" noRot="1" noChangeAspect="1" noMove="1" noResize="1" noEditPoints="1" noAdjustHandles="1" noChangeArrowheads="1" noChangeShapeType="1" noTextEdit="1"/>
-          </p:cNvSpPr>
-          <p:nvPr>
-            <p:extLst>
-              <p:ext uri="{386F3935-93C4-4BCD-93E2-E3B085C9AB24}">
-                <p16:designElem xmlns:p16="http://schemas.microsoft.com/office/powerpoint/2015/main" val="1"/>
-              </p:ext>
-            </p:extLst>
-          </p:nvPr>
-        </p:nvSpPr>
-        <p:spPr>
-          <a:xfrm>
-            <a:off x="2352" y="0"/>
-            <a:ext cx="9144000" cy="6858000"/>
-          </a:xfrm>
-          <a:prstGeom prst="rect">
-            <a:avLst/>
-          </a:prstGeom>
-          <a:solidFill>
-            <a:schemeClr val="bg1">
-              <a:lumMod val="75000"/>
-              <a:alpha val="80000"/>
-            </a:schemeClr>
-          </a:solidFill>
-          <a:ln>
-            <a:noFill/>
-          </a:ln>
-        </p:spPr>
-        <p:style>
-          <a:lnRef idx="2">
-            <a:schemeClr val="accent1">
-              <a:shade val="50000"/>
-            </a:schemeClr>
-          </a:lnRef>
-          <a:fillRef idx="1">
-            <a:schemeClr val="accent1"/>
-          </a:fillRef>
-          <a:effectRef idx="0">
-            <a:schemeClr val="accent1"/>
-          </a:effectRef>
-          <a:fontRef idx="minor">
-            <a:schemeClr val="lt1"/>
-          </a:fontRef>
-        </p:style>
-        <p:txBody>
-          <a:bodyPr rtlCol="0" anchor="ctr"/>
-          <a:lstStyle/>
-          <a:p>
-            <a:pPr algn="ctr"/>
-            <a:endParaRPr lang="en-US"/>
-          </a:p>
-        </p:txBody>
-      </p:sp>
-      <p:sp>
-        <p:nvSpPr>
-          <p:cNvPr id="35" name="Rectangle 14">
-            <a:extLst>
-              <a:ext uri="{FF2B5EF4-FFF2-40B4-BE49-F238E27FC236}">
-                <a16:creationId xmlns:a16="http://schemas.microsoft.com/office/drawing/2014/main" id="{627DB8AB-CD55-4C8F-9043-52652B89231A}"/>
-              </a:ext>
-              <a:ext uri="{C183D7F6-B498-43B3-948B-1728B52AA6E4}">
-                <adec:decorative xmlns:adec="http://schemas.microsoft.com/office/drawing/2017/decorative" val="1"/>
-              </a:ext>
-            </a:extLst>
-          </p:cNvPr>
-          <p:cNvSpPr>
-            <a:spLocks noGrp="1" noRot="1" noChangeAspect="1" noMove="1" noResize="1" noEditPoints="1" noAdjustHandles="1" noChangeArrowheads="1" noChangeShapeType="1" noTextEdit="1"/>
-          </p:cNvSpPr>
-          <p:nvPr>
-            <p:extLst>
-              <p:ext uri="{386F3935-93C4-4BCD-93E2-E3B085C9AB24}">
-                <p16:designElem xmlns:p16="http://schemas.microsoft.com/office/powerpoint/2015/main" val="1"/>
-              </p:ext>
-            </p:extLst>
-          </p:nvPr>
-        </p:nvSpPr>
-        <p:spPr>
-          <a:xfrm>
-            <a:off x="482599" y="643466"/>
-            <a:ext cx="4023191" cy="2706794"/>
-          </a:xfrm>
-          <a:prstGeom prst="rect">
-            <a:avLst/>
-          </a:prstGeom>
-          <a:solidFill>
-            <a:srgbClr val="FFFFFF"/>
-          </a:solidFill>
-          <a:ln w="9525">
-            <a:noFill/>
-          </a:ln>
-          <a:effectLst>
-            <a:outerShdw blurRad="63500" dist="17780" dir="5400000" algn="t" rotWithShape="0">
-              <a:prstClr val="black">
-                <a:alpha val="43000"/>
-              </a:prstClr>
-            </a:outerShdw>
-          </a:effectLst>
-        </p:spPr>
-        <p:style>
-          <a:lnRef idx="2">
-            <a:schemeClr val="accent1">
-              <a:shade val="50000"/>
-            </a:schemeClr>
-          </a:lnRef>
-          <a:fillRef idx="1">
-            <a:schemeClr val="accent1"/>
-          </a:fillRef>
-          <a:effectRef idx="0">
-            <a:schemeClr val="accent1"/>
-          </a:effectRef>
-          <a:fontRef idx="minor">
-            <a:schemeClr val="lt1"/>
-          </a:fontRef>
-        </p:style>
-        <p:txBody>
-          <a:bodyPr rtlCol="0" anchor="ctr"/>
-          <a:lstStyle/>
-          <a:p>
-            <a:pPr algn="ctr"/>
-            <a:endParaRPr lang="en-US"/>
-          </a:p>
-        </p:txBody>
-      </p:sp>
-      <p:sp>
-        <p:nvSpPr>
-          <p:cNvPr id="36" name="Rectangle 16">
-            <a:extLst>
-              <a:ext uri="{FF2B5EF4-FFF2-40B4-BE49-F238E27FC236}">
-                <a16:creationId xmlns:a16="http://schemas.microsoft.com/office/drawing/2014/main" id="{53059C5A-91CB-4024-9B4E-20082E25C70B}"/>
-              </a:ext>
-              <a:ext uri="{C183D7F6-B498-43B3-948B-1728B52AA6E4}">
-                <adec:decorative xmlns:adec="http://schemas.microsoft.com/office/drawing/2017/decorative" val="1"/>
-              </a:ext>
-            </a:extLst>
-          </p:cNvPr>
-          <p:cNvSpPr>
-            <a:spLocks noGrp="1" noRot="1" noChangeAspect="1" noMove="1" noResize="1" noEditPoints="1" noAdjustHandles="1" noChangeArrowheads="1" noChangeShapeType="1" noTextEdit="1"/>
-          </p:cNvSpPr>
-          <p:nvPr>
-            <p:extLst>
-              <p:ext uri="{386F3935-93C4-4BCD-93E2-E3B085C9AB24}">
-                <p16:designElem xmlns:p16="http://schemas.microsoft.com/office/powerpoint/2015/main" val="1"/>
-              </p:ext>
-            </p:extLst>
-          </p:nvPr>
-        </p:nvSpPr>
-        <p:spPr>
-          <a:xfrm>
-            <a:off x="4626441" y="643466"/>
-            <a:ext cx="4032605" cy="2706794"/>
-          </a:xfrm>
-          <a:prstGeom prst="rect">
-            <a:avLst/>
-          </a:prstGeom>
-          <a:solidFill>
-            <a:srgbClr val="FFFFFF"/>
-          </a:solidFill>
-          <a:ln w="9525">
-            <a:noFill/>
-          </a:ln>
-          <a:effectLst>
-            <a:outerShdw blurRad="63500" dist="17780" dir="5400000" algn="t" rotWithShape="0">
-              <a:prstClr val="black">
-                <a:alpha val="43000"/>
-              </a:prstClr>
-            </a:outerShdw>
-          </a:effectLst>
-        </p:spPr>
-        <p:style>
-          <a:lnRef idx="2">
-            <a:schemeClr val="accent1">
-              <a:shade val="50000"/>
-            </a:schemeClr>
-          </a:lnRef>
-          <a:fillRef idx="1">
-            <a:schemeClr val="accent1"/>
-          </a:fillRef>
-          <a:effectRef idx="0">
-            <a:schemeClr val="accent1"/>
-          </a:effectRef>
-          <a:fontRef idx="minor">
-            <a:schemeClr val="lt1"/>
-          </a:fontRef>
-        </p:style>
-        <p:txBody>
-          <a:bodyPr rtlCol="0" anchor="ctr"/>
-          <a:lstStyle/>
-          <a:p>
-            <a:pPr algn="ctr"/>
-            <a:endParaRPr lang="en-US"/>
-          </a:p>
-        </p:txBody>
-      </p:sp>
-      <p:pic>
-        <p:nvPicPr>
-          <p:cNvPr id="7" name="TheoreticalStrength.mpg">
-            <a:hlinkClick r:id="" action="ppaction://media"/>
-            <a:extLst>
-              <a:ext uri="{FF2B5EF4-FFF2-40B4-BE49-F238E27FC236}">
-                <a16:creationId xmlns:a16="http://schemas.microsoft.com/office/drawing/2014/main" id="{D00487CB-E47C-496B-A767-4E667BC60CB3}"/>
-              </a:ext>
-            </a:extLst>
-          </p:cNvPr>
-          <p:cNvPicPr>
-            <a:picLocks noChangeAspect="1"/>
-          </p:cNvPicPr>
-          <p:nvPr>
-            <a:videoFile r:link="rId2"/>
-            <p:extLst>
-              <p:ext uri="{DAA4B4D4-6D71-4841-9C94-3DE7FCFB9230}">
-                <p14:media xmlns:p14="http://schemas.microsoft.com/office/powerpoint/2010/main" r:embed="rId1"/>
-              </p:ext>
-            </p:extLst>
-          </p:nvPr>
-        </p:nvPicPr>
-        <p:blipFill rotWithShape="1">
-          <a:blip r:embed="rId9" cstate="print"/>
-          <a:srcRect l="6266" t="11186" r="2689" b="17177"/>
-          <a:stretch/>
-        </p:blipFill>
-        <p:spPr>
-          <a:xfrm>
-            <a:off x="893756" y="966713"/>
-            <a:ext cx="3200400" cy="2060298"/>
-          </a:xfrm>
-          <a:prstGeom prst="rect">
-            <a:avLst/>
-          </a:prstGeom>
-        </p:spPr>
-      </p:pic>
-      <p:sp>
-        <p:nvSpPr>
-          <p:cNvPr id="37" name="Rectangle 18">
-            <a:extLst>
-              <a:ext uri="{FF2B5EF4-FFF2-40B4-BE49-F238E27FC236}">
-                <a16:creationId xmlns:a16="http://schemas.microsoft.com/office/drawing/2014/main" id="{184884BF-A898-4EFF-9504-E13EBE3FF62E}"/>
-              </a:ext>
-              <a:ext uri="{C183D7F6-B498-43B3-948B-1728B52AA6E4}">
-                <adec:decorative xmlns:adec="http://schemas.microsoft.com/office/drawing/2017/decorative" val="1"/>
-              </a:ext>
-            </a:extLst>
-          </p:cNvPr>
-          <p:cNvSpPr>
-            <a:spLocks noGrp="1" noRot="1" noChangeAspect="1" noMove="1" noResize="1" noEditPoints="1" noAdjustHandles="1" noChangeArrowheads="1" noChangeShapeType="1" noTextEdit="1"/>
-          </p:cNvSpPr>
-          <p:nvPr>
-            <p:extLst>
-              <p:ext uri="{386F3935-93C4-4BCD-93E2-E3B085C9AB24}">
-                <p16:designElem xmlns:p16="http://schemas.microsoft.com/office/powerpoint/2015/main" val="1"/>
-              </p:ext>
-            </p:extLst>
-          </p:nvPr>
-        </p:nvSpPr>
-        <p:spPr>
-          <a:xfrm>
-            <a:off x="482599" y="3514513"/>
-            <a:ext cx="4023191" cy="2703406"/>
-          </a:xfrm>
-          <a:prstGeom prst="rect">
-            <a:avLst/>
-          </a:prstGeom>
-          <a:solidFill>
-            <a:srgbClr val="FFFFFF"/>
-          </a:solidFill>
-          <a:ln w="9525">
-            <a:noFill/>
-          </a:ln>
-          <a:effectLst>
-            <a:outerShdw blurRad="63500" dist="17780" dir="5400000" algn="t" rotWithShape="0">
-              <a:prstClr val="black">
-                <a:alpha val="43000"/>
-              </a:prstClr>
-            </a:outerShdw>
-          </a:effectLst>
-        </p:spPr>
-        <p:style>
-          <a:lnRef idx="2">
-            <a:schemeClr val="accent1">
-              <a:shade val="50000"/>
-            </a:schemeClr>
-          </a:lnRef>
-          <a:fillRef idx="1">
-            <a:schemeClr val="accent1"/>
-          </a:fillRef>
-          <a:effectRef idx="0">
-            <a:schemeClr val="accent1"/>
-          </a:effectRef>
-          <a:fontRef idx="minor">
-            <a:schemeClr val="lt1"/>
-          </a:fontRef>
-        </p:style>
-        <p:txBody>
-          <a:bodyPr rtlCol="0" anchor="ctr"/>
-          <a:lstStyle/>
-          <a:p>
-            <a:pPr algn="ctr"/>
-            <a:endParaRPr lang="en-US"/>
-          </a:p>
-        </p:txBody>
-      </p:sp>
-      <p:sp>
-        <p:nvSpPr>
-          <p:cNvPr id="38" name="Rectangle 20">
-            <a:extLst>
-              <a:ext uri="{FF2B5EF4-FFF2-40B4-BE49-F238E27FC236}">
-                <a16:creationId xmlns:a16="http://schemas.microsoft.com/office/drawing/2014/main" id="{7B32D337-FDA6-4468-ADB1-7038E5FC0BA9}"/>
-              </a:ext>
-              <a:ext uri="{C183D7F6-B498-43B3-948B-1728B52AA6E4}">
-                <adec:decorative xmlns:adec="http://schemas.microsoft.com/office/drawing/2017/decorative" val="1"/>
-              </a:ext>
-            </a:extLst>
-          </p:cNvPr>
-          <p:cNvSpPr>
-            <a:spLocks noGrp="1" noRot="1" noChangeAspect="1" noMove="1" noResize="1" noEditPoints="1" noAdjustHandles="1" noChangeArrowheads="1" noChangeShapeType="1" noTextEdit="1"/>
-          </p:cNvSpPr>
-          <p:nvPr>
-            <p:extLst>
-              <p:ext uri="{386F3935-93C4-4BCD-93E2-E3B085C9AB24}">
-                <p16:designElem xmlns:p16="http://schemas.microsoft.com/office/powerpoint/2015/main" val="1"/>
-              </p:ext>
-            </p:extLst>
-          </p:nvPr>
-        </p:nvSpPr>
-        <p:spPr>
-          <a:xfrm>
-            <a:off x="4626441" y="3514513"/>
-            <a:ext cx="4032605" cy="2706794"/>
-          </a:xfrm>
-          <a:prstGeom prst="rect">
-            <a:avLst/>
-          </a:prstGeom>
-          <a:solidFill>
-            <a:srgbClr val="FFFFFF"/>
-          </a:solidFill>
-          <a:ln w="9525">
-            <a:noFill/>
-          </a:ln>
-          <a:effectLst>
-            <a:outerShdw blurRad="63500" dist="17780" dir="5400000" algn="t" rotWithShape="0">
-              <a:prstClr val="black">
-                <a:alpha val="43000"/>
-              </a:prstClr>
-            </a:outerShdw>
-          </a:effectLst>
-        </p:spPr>
-        <p:style>
-          <a:lnRef idx="2">
-            <a:schemeClr val="accent1">
-              <a:shade val="50000"/>
-            </a:schemeClr>
-          </a:lnRef>
-          <a:fillRef idx="1">
-            <a:schemeClr val="accent1"/>
-          </a:fillRef>
-          <a:effectRef idx="0">
-            <a:schemeClr val="accent1"/>
-          </a:effectRef>
-          <a:fontRef idx="minor">
-            <a:schemeClr val="lt1"/>
-          </a:fontRef>
-        </p:style>
-        <p:txBody>
-          <a:bodyPr rtlCol="0" anchor="ctr"/>
-          <a:lstStyle/>
-          <a:p>
-            <a:pPr algn="ctr"/>
-            <a:endParaRPr lang="en-US"/>
-          </a:p>
-        </p:txBody>
-      </p:sp>
-      <p:pic>
-        <p:nvPicPr>
-          <p:cNvPr id="8" name="edge under shear.mpg">
-            <a:hlinkClick r:id="" action="ppaction://media"/>
-            <a:extLst>
-              <a:ext uri="{FF2B5EF4-FFF2-40B4-BE49-F238E27FC236}">
-                <a16:creationId xmlns:a16="http://schemas.microsoft.com/office/drawing/2014/main" id="{0C0F8B3E-54AA-4F60-BB26-FDE496C6343C}"/>
-              </a:ext>
-            </a:extLst>
-          </p:cNvPr>
-          <p:cNvPicPr>
-            <a:picLocks noChangeAspect="1"/>
-          </p:cNvPicPr>
-          <p:nvPr>
-            <a:videoFile r:link="rId4"/>
-            <p:extLst>
-              <p:ext uri="{DAA4B4D4-6D71-4841-9C94-3DE7FCFB9230}">
-                <p14:media xmlns:p14="http://schemas.microsoft.com/office/powerpoint/2010/main" r:embed="rId3"/>
-              </p:ext>
-            </p:extLst>
-          </p:nvPr>
-        </p:nvPicPr>
-        <p:blipFill>
-          <a:blip r:embed="rId10" cstate="print"/>
-          <a:stretch>
-            <a:fillRect/>
-          </a:stretch>
-        </p:blipFill>
-        <p:spPr>
-          <a:xfrm>
-            <a:off x="5272612" y="831710"/>
-            <a:ext cx="2848151" cy="2330305"/>
-          </a:xfrm>
-          <a:prstGeom prst="rect">
-            <a:avLst/>
-          </a:prstGeom>
-        </p:spPr>
-      </p:pic>
-      <p:pic>
-        <p:nvPicPr>
-          <p:cNvPr id="4" name="Online Media 1" title="Bubble Raft Model - part 1">
-            <a:hlinkClick r:id="" action="ppaction://media"/>
-            <a:extLst>
-              <a:ext uri="{FF2B5EF4-FFF2-40B4-BE49-F238E27FC236}">
-                <a16:creationId xmlns:a16="http://schemas.microsoft.com/office/drawing/2014/main" id="{7C9C8180-0FA4-4A6A-818D-07E82D35ED37}"/>
-              </a:ext>
-            </a:extLst>
-          </p:cNvPr>
-          <p:cNvPicPr>
-            <a:picLocks noRot="1" noChangeAspect="1"/>
-          </p:cNvPicPr>
-          <p:nvPr>
-            <a:videoFile r:link="rId5"/>
-          </p:nvPr>
-        </p:nvPicPr>
-        <p:blipFill>
-          <a:blip r:embed="rId11"/>
-          <a:stretch>
-            <a:fillRect/>
-          </a:stretch>
-        </p:blipFill>
-        <p:spPr>
-          <a:xfrm>
-            <a:off x="1120424" y="3859205"/>
-            <a:ext cx="2716213" cy="2037160"/>
-          </a:xfrm>
-          <a:prstGeom prst="rect">
-            <a:avLst/>
-          </a:prstGeom>
-        </p:spPr>
-      </p:pic>
-      <p:pic>
-        <p:nvPicPr>
-          <p:cNvPr id="2" name="Online Media 1" title="Dislocation glide">
-            <a:hlinkClick r:id="" action="ppaction://media"/>
-            <a:extLst>
-              <a:ext uri="{FF2B5EF4-FFF2-40B4-BE49-F238E27FC236}">
-                <a16:creationId xmlns:a16="http://schemas.microsoft.com/office/drawing/2014/main" id="{4BE029CA-7D88-4D8C-AEBA-DC117C83BE0C}"/>
-              </a:ext>
-            </a:extLst>
-          </p:cNvPr>
-          <p:cNvPicPr>
-            <a:picLocks noRot="1" noChangeAspect="1"/>
-          </p:cNvPicPr>
-          <p:nvPr>
-            <a:videoFile r:link="rId6"/>
-          </p:nvPr>
-        </p:nvPicPr>
-        <p:blipFill>
-          <a:blip r:embed="rId12"/>
-          <a:stretch>
-            <a:fillRect/>
-          </a:stretch>
-        </p:blipFill>
-        <p:spPr>
-          <a:xfrm>
-            <a:off x="5203802" y="3810000"/>
-            <a:ext cx="2812671" cy="2109503"/>
-          </a:xfrm>
-          <a:prstGeom prst="rect">
-            <a:avLst/>
-          </a:prstGeom>
-        </p:spPr>
-      </p:pic>
-    </p:spTree>
-    <p:extLst>
-      <p:ext uri="{BB962C8B-B14F-4D97-AF65-F5344CB8AC3E}">
-        <p14:creationId xmlns:p14="http://schemas.microsoft.com/office/powerpoint/2010/main" val="240556338"/>
-      </p:ext>
-    </p:extLst>
-  </p:cSld>
-  <p:clrMapOvr>
-    <a:masterClrMapping/>
-  </p:clrMapOvr>
-  <mc:AlternateContent xmlns:mc="http://schemas.openxmlformats.org/markup-compatibility/2006" xmlns:p159="http://schemas.microsoft.com/office/powerpoint/2015/09/main">
-    <mc:Choice Requires="p159">
-      <p:transition xmlns:p14="http://schemas.microsoft.com/office/powerpoint/2010/main" spd="slow" p14:dur="2000">
-        <p159:morph option="byObject"/>
-      </p:transition>
-    </mc:Choice>
-    <mc:Fallback xmlns="">
-      <p:transition spd="slow">
-        <p:fade/>
-      </p:transition>
-    </mc:Fallback>
-  </mc:AlternateContent>
-  <p:timing>
-    <p:tnLst>
-      <p:par>
-        <p:cTn id="1" dur="indefinite" restart="never" nodeType="tmRoot">
-          <p:childTnLst>
-            <p:video>
-              <p:cMediaNode vol="80000">
-                <p:cTn id="2" fill="hold" display="0">
-                  <p:stCondLst>
-                    <p:cond delay="indefinite"/>
-                  </p:stCondLst>
-                </p:cTn>
-                <p:tgtEl>
-                  <p:spTgt spid="2"/>
-                </p:tgtEl>
-              </p:cMediaNode>
-            </p:video>
-            <p:video>
-              <p:cMediaNode vol="80000">
-                <p:cTn id="3" fill="hold" display="0">
-                  <p:stCondLst>
-                    <p:cond delay="indefinite"/>
-                  </p:stCondLst>
-                </p:cTn>
-                <p:tgtEl>
-                  <p:spTgt spid="4"/>
-                </p:tgtEl>
-              </p:cMediaNode>
-            </p:video>
-            <p:video>
-              <p:cMediaNode>
-                <p:cTn id="4" fill="hold" display="0">
-                  <p:stCondLst>
-                    <p:cond delay="indefinite"/>
-                  </p:stCondLst>
-                  <p:endCondLst>
-                    <p:cond evt="onNext" delay="0">
-                      <p:tgtEl>
-                        <p:sldTgt/>
-                      </p:tgtEl>
-                    </p:cond>
-                    <p:cond evt="onPrev" delay="0">
-                      <p:tgtEl>
-                        <p:sldTgt/>
-                      </p:tgtEl>
-                    </p:cond>
-                  </p:endCondLst>
-                </p:cTn>
-                <p:tgtEl>
-                  <p:spTgt spid="7"/>
-                </p:tgtEl>
-              </p:cMediaNode>
-            </p:video>
-            <p:video>
-              <p:cMediaNode>
-                <p:cTn id="5" fill="hold" display="0">
-                  <p:stCondLst>
-                    <p:cond delay="indefinite"/>
-                  </p:stCondLst>
-                  <p:endCondLst>
-                    <p:cond evt="onNext" delay="0">
-                      <p:tgtEl>
-                        <p:sldTgt/>
-                      </p:tgtEl>
-                    </p:cond>
-                    <p:cond evt="onPrev" delay="0">
-                      <p:tgtEl>
-                        <p:sldTgt/>
-                      </p:tgtEl>
-                    </p:cond>
-                  </p:endCondLst>
-                </p:cTn>
-                <p:tgtEl>
-                  <p:spTgt spid="8"/>
-                </p:tgtEl>
-              </p:cMediaNode>
-            </p:video>
-          </p:childTnLst>
-        </p:cTn>
-      </p:par>
-    </p:tnLst>
-  </p:timing>
-</p:sld>
-</file>
-
-<file path=ppt/slides/slide12.xml><?xml version="1.0" encoding="utf-8"?>
-<p:sld xmlns:a="http://schemas.openxmlformats.org/drawingml/2006/main" xmlns:r="http://schemas.openxmlformats.org/officeDocument/2006/relationships" xmlns:p="http://schemas.openxmlformats.org/presentationml/2006/main">
-  <p:cSld>
-    <p:spTree>
-      <p:nvGrpSpPr>
-        <p:cNvPr id="1" name=""/>
-        <p:cNvGrpSpPr/>
-        <p:nvPr/>
-      </p:nvGrpSpPr>
-      <p:grpSpPr>
-        <a:xfrm>
-          <a:off x="0" y="0"/>
-          <a:ext cx="0" cy="0"/>
-          <a:chOff x="0" y="0"/>
-          <a:chExt cx="0" cy="0"/>
-        </a:xfrm>
-      </p:grpSpPr>
-      <p:pic>
-        <p:nvPicPr>
-          <p:cNvPr id="9218" name="Picture 2" descr="c05f08"/>
-          <p:cNvPicPr preferRelativeResize="0">
-            <a:picLocks noChangeAspect="1" noChangeArrowheads="1"/>
-          </p:cNvPicPr>
-          <p:nvPr>
-            <p:custDataLst>
-              <p:tags r:id="rId1"/>
-            </p:custDataLst>
-          </p:nvPr>
-        </p:nvPicPr>
-        <p:blipFill>
-          <a:blip r:embed="rId4" cstate="print"/>
-          <a:srcRect/>
-          <a:stretch>
-            <a:fillRect/>
-          </a:stretch>
-        </p:blipFill>
-        <p:spPr bwMode="auto">
-          <a:xfrm>
-            <a:off x="457200" y="838200"/>
-            <a:ext cx="6629400" cy="5362575"/>
-          </a:xfrm>
-          <a:prstGeom prst="rect">
-            <a:avLst/>
-          </a:prstGeom>
-          <a:noFill/>
-          <a:ln w="9525">
-            <a:noFill/>
-            <a:miter lim="800000"/>
-            <a:headEnd/>
-            <a:tailEnd/>
-          </a:ln>
-          <a:effectLst/>
-        </p:spPr>
-      </p:pic>
-      <p:sp>
-        <p:nvSpPr>
-          <p:cNvPr id="9219" name="Text Box 3"/>
-          <p:cNvSpPr txBox="1">
-            <a:spLocks noChangeArrowheads="1"/>
-          </p:cNvSpPr>
-          <p:nvPr>
-            <p:custDataLst>
-              <p:tags r:id="rId2"/>
-            </p:custDataLst>
-          </p:nvPr>
-        </p:nvSpPr>
-        <p:spPr bwMode="auto">
-          <a:xfrm>
-            <a:off x="5059363" y="228600"/>
-            <a:ext cx="2619375" cy="457200"/>
-          </a:xfrm>
-          <a:prstGeom prst="rect">
-            <a:avLst/>
-          </a:prstGeom>
-          <a:noFill/>
-          <a:ln w="9525">
-            <a:noFill/>
-            <a:miter lim="800000"/>
-            <a:headEnd/>
-            <a:tailEnd/>
-          </a:ln>
-          <a:effectLst/>
-        </p:spPr>
-        <p:txBody>
-          <a:bodyPr wrap="none">
-            <a:spAutoFit/>
-          </a:bodyPr>
-          <a:lstStyle/>
-          <a:p>
-            <a:pPr algn="ctr"/>
-            <a:r>
-              <a:rPr lang="en-US" sz="2400" b="1">
-                <a:solidFill>
-                  <a:srgbClr val="272727"/>
-                </a:solidFill>
-              </a:rPr>
-              <a:t>Edge dislocation</a:t>
-            </a:r>
-          </a:p>
-        </p:txBody>
-      </p:sp>
-      <p:sp>
-        <p:nvSpPr>
-          <p:cNvPr id="9220" name="Rectangle 4" hidden="1"/>
-          <p:cNvSpPr>
-            <a:spLocks noGrp="1" noChangeArrowheads="1"/>
-          </p:cNvSpPr>
-          <p:nvPr>
-            <p:ph type="title"/>
-          </p:nvPr>
-        </p:nvSpPr>
-        <p:spPr/>
-        <p:txBody>
-          <a:bodyPr/>
-          <a:lstStyle/>
-          <a:p>
-            <a:r>
-              <a:rPr lang="en-US"/>
-              <a:t>c05f08</a:t>
-            </a:r>
-          </a:p>
-        </p:txBody>
-      </p:sp>
-    </p:spTree>
-  </p:cSld>
-  <p:clrMapOvr>
-    <a:masterClrMapping/>
-  </p:clrMapOvr>
-</p:sld>
-</file>
-
-<file path=ppt/slides/slide13.xml><?xml version="1.0" encoding="utf-8"?>
-<p:sld xmlns:a="http://schemas.openxmlformats.org/drawingml/2006/main" xmlns:r="http://schemas.openxmlformats.org/officeDocument/2006/relationships" xmlns:p="http://schemas.openxmlformats.org/presentationml/2006/main">
-  <p:cSld>
-    <p:spTree>
-      <p:nvGrpSpPr>
-        <p:cNvPr id="1" name=""/>
-        <p:cNvGrpSpPr/>
-        <p:nvPr/>
-      </p:nvGrpSpPr>
-      <p:grpSpPr>
-        <a:xfrm>
-          <a:off x="0" y="0"/>
-          <a:ext cx="0" cy="0"/>
-          <a:chOff x="0" y="0"/>
-          <a:chExt cx="0" cy="0"/>
-        </a:xfrm>
-      </p:grpSpPr>
-      <p:pic>
-        <p:nvPicPr>
-          <p:cNvPr id="10242" name="Picture 2" descr="c05f09"/>
-          <p:cNvPicPr preferRelativeResize="0">
-            <a:picLocks noChangeAspect="1" noChangeArrowheads="1"/>
-          </p:cNvPicPr>
-          <p:nvPr>
-            <p:custDataLst>
-              <p:tags r:id="rId1"/>
-            </p:custDataLst>
-          </p:nvPr>
-        </p:nvPicPr>
-        <p:blipFill>
-          <a:blip r:embed="rId4" cstate="print"/>
-          <a:srcRect r="296" b="44444"/>
-          <a:stretch>
-            <a:fillRect/>
-          </a:stretch>
-        </p:blipFill>
-        <p:spPr bwMode="auto">
-          <a:xfrm>
-            <a:off x="1257795" y="1295400"/>
-            <a:ext cx="5334000" cy="4898609"/>
-          </a:xfrm>
-          <a:prstGeom prst="rect">
-            <a:avLst/>
-          </a:prstGeom>
-          <a:noFill/>
-          <a:ln w="9525">
-            <a:noFill/>
-            <a:miter lim="800000"/>
-            <a:headEnd/>
-            <a:tailEnd/>
-          </a:ln>
-          <a:effectLst/>
-        </p:spPr>
-      </p:pic>
-      <p:sp>
-        <p:nvSpPr>
-          <p:cNvPr id="10243" name="Text Box 3"/>
-          <p:cNvSpPr txBox="1">
-            <a:spLocks noChangeArrowheads="1"/>
-          </p:cNvSpPr>
-          <p:nvPr>
-            <p:custDataLst>
-              <p:tags r:id="rId2"/>
-            </p:custDataLst>
-          </p:nvPr>
-        </p:nvSpPr>
-        <p:spPr bwMode="auto">
-          <a:xfrm>
-            <a:off x="5562600" y="838200"/>
-            <a:ext cx="2773363" cy="457200"/>
-          </a:xfrm>
-          <a:prstGeom prst="rect">
-            <a:avLst/>
-          </a:prstGeom>
-          <a:noFill/>
-          <a:ln w="9525">
-            <a:noFill/>
-            <a:miter lim="800000"/>
-            <a:headEnd/>
-            <a:tailEnd/>
-          </a:ln>
-          <a:effectLst/>
-        </p:spPr>
-        <p:txBody>
-          <a:bodyPr wrap="none" anchor="ctr">
-            <a:spAutoFit/>
-          </a:bodyPr>
-          <a:lstStyle/>
-          <a:p>
-            <a:pPr algn="ctr"/>
-            <a:r>
-              <a:rPr lang="en-US" sz="2400" b="1">
-                <a:solidFill>
-                  <a:srgbClr val="272727"/>
-                </a:solidFill>
-              </a:rPr>
-              <a:t>Screw dislocation</a:t>
-            </a:r>
-          </a:p>
-        </p:txBody>
-      </p:sp>
-      <p:sp>
-        <p:nvSpPr>
-          <p:cNvPr id="10244" name="Rectangle 4" hidden="1"/>
-          <p:cNvSpPr>
-            <a:spLocks noGrp="1" noChangeArrowheads="1"/>
-          </p:cNvSpPr>
-          <p:nvPr>
-            <p:ph type="title"/>
-          </p:nvPr>
-        </p:nvSpPr>
-        <p:spPr/>
-        <p:txBody>
-          <a:bodyPr/>
-          <a:lstStyle/>
-          <a:p>
-            <a:r>
-              <a:rPr lang="en-US"/>
-              <a:t>c05f09</a:t>
-            </a:r>
-          </a:p>
-        </p:txBody>
-      </p:sp>
-    </p:spTree>
-  </p:cSld>
-  <p:clrMapOvr>
-    <a:masterClrMapping/>
-  </p:clrMapOvr>
 </p:sld>
 </file>
 
@@ -9619,1731 +7357,9 @@
 </p:sld>
 </file>
 
-<file path=ppt/slides/slide7.xml><?xml version="1.0" encoding="utf-8"?>
-<p:sld xmlns:a="http://schemas.openxmlformats.org/drawingml/2006/main" xmlns:r="http://schemas.openxmlformats.org/officeDocument/2006/relationships" xmlns:p="http://schemas.openxmlformats.org/presentationml/2006/main">
-  <p:cSld>
-    <p:bg>
-      <p:bgPr>
-        <a:solidFill>
-          <a:schemeClr val="bg1">
-            <a:tint val="95000"/>
-            <a:satMod val="170000"/>
-          </a:schemeClr>
-        </a:solidFill>
-        <a:effectLst/>
-      </p:bgPr>
-    </p:bg>
-    <p:spTree>
-      <p:nvGrpSpPr>
-        <p:cNvPr id="1" name=""/>
-        <p:cNvGrpSpPr/>
-        <p:nvPr/>
-      </p:nvGrpSpPr>
-      <p:grpSpPr>
-        <a:xfrm>
-          <a:off x="0" y="0"/>
-          <a:ext cx="0" cy="0"/>
-          <a:chOff x="0" y="0"/>
-          <a:chExt cx="0" cy="0"/>
-        </a:xfrm>
-      </p:grpSpPr>
-      <p:sp>
-        <p:nvSpPr>
-          <p:cNvPr id="12291" name="Text Box 3"/>
-          <p:cNvSpPr txBox="1">
-            <a:spLocks noChangeArrowheads="1"/>
-          </p:cNvSpPr>
-          <p:nvPr>
-            <p:custDataLst>
-              <p:tags r:id="rId1"/>
-            </p:custDataLst>
-          </p:nvPr>
-        </p:nvSpPr>
-        <p:spPr bwMode="auto">
-          <a:xfrm>
-            <a:off x="3384517" y="5257800"/>
-            <a:ext cx="2101884" cy="1371600"/>
-          </a:xfrm>
-          <a:prstGeom prst="rect">
-            <a:avLst/>
-          </a:prstGeom>
-        </p:spPr>
-        <p:txBody>
-          <a:bodyPr vert="horz" lIns="91440" tIns="45720" rIns="91440" bIns="45720" rtlCol="0" anchor="b">
-            <a:normAutofit/>
-          </a:bodyPr>
-          <a:lstStyle/>
-          <a:p>
-            <a:pPr>
-              <a:lnSpc>
-                <a:spcPct val="90000"/>
-              </a:lnSpc>
-              <a:spcAft>
-                <a:spcPts val="600"/>
-              </a:spcAft>
-            </a:pPr>
-            <a:r>
-              <a:rPr lang="en-US" sz="1800" b="1" dirty="0">
-                <a:latin typeface="+mj-lt"/>
-                <a:ea typeface="+mj-ea"/>
-                <a:cs typeface="+mj-cs"/>
-              </a:rPr>
-              <a:t>Dislocations in a </a:t>
-            </a:r>
-          </a:p>
-          <a:p>
-            <a:pPr>
-              <a:lnSpc>
-                <a:spcPct val="90000"/>
-              </a:lnSpc>
-              <a:spcAft>
-                <a:spcPts val="600"/>
-              </a:spcAft>
-            </a:pPr>
-            <a:r>
-              <a:rPr lang="en-US" sz="1800" b="1" dirty="0">
-                <a:latin typeface="+mj-lt"/>
-                <a:ea typeface="+mj-ea"/>
-                <a:cs typeface="+mj-cs"/>
-              </a:rPr>
-              <a:t>titanium alloy </a:t>
-            </a:r>
-          </a:p>
-          <a:p>
-            <a:pPr>
-              <a:lnSpc>
-                <a:spcPct val="90000"/>
-              </a:lnSpc>
-              <a:spcAft>
-                <a:spcPts val="600"/>
-              </a:spcAft>
-            </a:pPr>
-            <a:r>
-              <a:rPr lang="en-US" sz="1800" b="1" dirty="0">
-                <a:latin typeface="+mj-lt"/>
-                <a:ea typeface="+mj-ea"/>
-                <a:cs typeface="+mj-cs"/>
-              </a:rPr>
-              <a:t>at 51,500X</a:t>
-            </a:r>
-          </a:p>
-        </p:txBody>
-      </p:sp>
-      <p:sp>
-        <p:nvSpPr>
-          <p:cNvPr id="73" name="Freeform: Shape 72">
-            <a:extLst>
-              <a:ext uri="{FF2B5EF4-FFF2-40B4-BE49-F238E27FC236}">
-                <a16:creationId xmlns:a16="http://schemas.microsoft.com/office/drawing/2014/main" id="{1DB7C82F-AB7E-4F0C-B829-FA1B9C415180}"/>
-              </a:ext>
-              <a:ext uri="{C183D7F6-B498-43B3-948B-1728B52AA6E4}">
-                <adec:decorative xmlns:adec="http://schemas.microsoft.com/office/drawing/2017/decorative" val="1"/>
-              </a:ext>
-            </a:extLst>
-          </p:cNvPr>
-          <p:cNvSpPr>
-            <a:spLocks noGrp="1" noRot="1" noChangeAspect="1" noMove="1" noResize="1" noEditPoints="1" noAdjustHandles="1" noChangeArrowheads="1" noChangeShapeType="1" noTextEdit="1"/>
-          </p:cNvSpPr>
-          <p:nvPr>
-            <p:extLst>
-              <p:ext uri="{386F3935-93C4-4BCD-93E2-E3B085C9AB24}">
-                <p16:designElem xmlns:p16="http://schemas.microsoft.com/office/powerpoint/2015/main" val="1"/>
-              </p:ext>
-            </p:extLst>
-          </p:nvPr>
-        </p:nvSpPr>
-        <p:spPr>
-          <a:xfrm flipH="1">
-            <a:off x="0" y="0"/>
-            <a:ext cx="4629586" cy="6858000"/>
-          </a:xfrm>
-          <a:custGeom>
-            <a:avLst/>
-            <a:gdLst>
-              <a:gd name="connsiteX0" fmla="*/ 6172782 w 6172782"/>
-              <a:gd name="connsiteY0" fmla="*/ 0 h 6858000"/>
-              <a:gd name="connsiteX1" fmla="*/ 69075 w 6172782"/>
-              <a:gd name="connsiteY1" fmla="*/ 0 h 6858000"/>
-              <a:gd name="connsiteX2" fmla="*/ 35131 w 6172782"/>
-              <a:gd name="connsiteY2" fmla="*/ 267128 h 6858000"/>
-              <a:gd name="connsiteX3" fmla="*/ 0 w 6172782"/>
-              <a:gd name="connsiteY3" fmla="*/ 962845 h 6858000"/>
-              <a:gd name="connsiteX4" fmla="*/ 3276103 w 6172782"/>
-              <a:gd name="connsiteY4" fmla="*/ 6782205 h 6858000"/>
-              <a:gd name="connsiteX5" fmla="*/ 3407923 w 6172782"/>
-              <a:gd name="connsiteY5" fmla="*/ 6858000 h 6858000"/>
-              <a:gd name="connsiteX6" fmla="*/ 6172782 w 6172782"/>
-              <a:gd name="connsiteY6" fmla="*/ 6858000 h 6858000"/>
-            </a:gdLst>
-            <a:ahLst/>
-            <a:cxnLst>
-              <a:cxn ang="0">
-                <a:pos x="connsiteX0" y="connsiteY0"/>
-              </a:cxn>
-              <a:cxn ang="0">
-                <a:pos x="connsiteX1" y="connsiteY1"/>
-              </a:cxn>
-              <a:cxn ang="0">
-                <a:pos x="connsiteX2" y="connsiteY2"/>
-              </a:cxn>
-              <a:cxn ang="0">
-                <a:pos x="connsiteX3" y="connsiteY3"/>
-              </a:cxn>
-              <a:cxn ang="0">
-                <a:pos x="connsiteX4" y="connsiteY4"/>
-              </a:cxn>
-              <a:cxn ang="0">
-                <a:pos x="connsiteX5" y="connsiteY5"/>
-              </a:cxn>
-              <a:cxn ang="0">
-                <a:pos x="connsiteX6" y="connsiteY6"/>
-              </a:cxn>
-            </a:cxnLst>
-            <a:rect l="l" t="t" r="r" b="b"/>
-            <a:pathLst>
-              <a:path w="6172782" h="6858000">
-                <a:moveTo>
-                  <a:pt x="6172782" y="0"/>
-                </a:moveTo>
-                <a:lnTo>
-                  <a:pt x="69075" y="0"/>
-                </a:lnTo>
-                <a:lnTo>
-                  <a:pt x="35131" y="267128"/>
-                </a:lnTo>
-                <a:cubicBezTo>
-                  <a:pt x="11901" y="495874"/>
-                  <a:pt x="0" y="727970"/>
-                  <a:pt x="0" y="962845"/>
-                </a:cubicBezTo>
-                <a:cubicBezTo>
-                  <a:pt x="0" y="3429034"/>
-                  <a:pt x="1312002" y="5588789"/>
-                  <a:pt x="3276103" y="6782205"/>
-                </a:cubicBezTo>
-                <a:lnTo>
-                  <a:pt x="3407923" y="6858000"/>
-                </a:lnTo>
-                <a:lnTo>
-                  <a:pt x="6172782" y="6858000"/>
-                </a:lnTo>
-                <a:close/>
-              </a:path>
-            </a:pathLst>
-          </a:custGeom>
-          <a:solidFill>
-            <a:srgbClr val="FFFFFF">
-              <a:alpha val="80000"/>
-            </a:srgbClr>
-          </a:solidFill>
-          <a:ln>
-            <a:noFill/>
-          </a:ln>
-        </p:spPr>
-        <p:style>
-          <a:lnRef idx="2">
-            <a:schemeClr val="accent1">
-              <a:shade val="50000"/>
-            </a:schemeClr>
-          </a:lnRef>
-          <a:fillRef idx="1">
-            <a:schemeClr val="accent1"/>
-          </a:fillRef>
-          <a:effectRef idx="0">
-            <a:schemeClr val="accent1"/>
-          </a:effectRef>
-          <a:fontRef idx="minor">
-            <a:schemeClr val="lt1"/>
-          </a:fontRef>
-        </p:style>
-        <p:txBody>
-          <a:bodyPr wrap="square" rtlCol="0" anchor="ctr">
-            <a:noAutofit/>
-          </a:bodyPr>
-          <a:lstStyle/>
-          <a:p>
-            <a:pPr marL="0" marR="0" lvl="0" indent="0" algn="ctr" defTabSz="914400" rtl="0" eaLnBrk="1" fontAlgn="auto" latinLnBrk="0" hangingPunct="1">
-              <a:lnSpc>
-                <a:spcPct val="100000"/>
-              </a:lnSpc>
-              <a:spcBef>
-                <a:spcPts val="0"/>
-              </a:spcBef>
-              <a:spcAft>
-                <a:spcPts val="0"/>
-              </a:spcAft>
-              <a:buClrTx/>
-              <a:buSzTx/>
-              <a:buFontTx/>
-              <a:buNone/>
-              <a:tabLst/>
-              <a:defRPr/>
-            </a:pPr>
-            <a:endParaRPr kumimoji="0" lang="en-US" sz="1800" b="0" i="0" u="none" strike="noStrike" kern="1200" cap="none" spc="0" normalizeH="0" baseline="0" noProof="0">
-              <a:ln>
-                <a:noFill/>
-              </a:ln>
-              <a:solidFill>
-                <a:prstClr val="white"/>
-              </a:solidFill>
-              <a:effectLst/>
-              <a:uLnTx/>
-              <a:uFillTx/>
-              <a:latin typeface="Calibri" panose="020F0502020204030204"/>
-              <a:ea typeface="+mn-ea"/>
-              <a:cs typeface="+mn-cs"/>
-            </a:endParaRPr>
-          </a:p>
-        </p:txBody>
-      </p:sp>
-      <p:pic>
-        <p:nvPicPr>
-          <p:cNvPr id="12290" name="Picture 2" descr="c05f11"/>
-          <p:cNvPicPr preferRelativeResize="0">
-            <a:picLocks noChangeAspect="1" noChangeArrowheads="1"/>
-          </p:cNvPicPr>
-          <p:nvPr>
-            <p:custDataLst>
-              <p:tags r:id="rId2"/>
-            </p:custDataLst>
-          </p:nvPr>
-        </p:nvPicPr>
-        <p:blipFill rotWithShape="1">
-          <a:blip r:embed="rId5" cstate="print"/>
-          <a:srcRect l="5824" r="15040"/>
-          <a:stretch/>
-        </p:blipFill>
-        <p:spPr bwMode="auto">
-          <a:xfrm>
-            <a:off x="20" y="10"/>
-            <a:ext cx="4518095" cy="6857990"/>
-          </a:xfrm>
-          <a:custGeom>
-            <a:avLst/>
-            <a:gdLst/>
-            <a:ahLst/>
-            <a:cxnLst/>
-            <a:rect l="l" t="t" r="r" b="b"/>
-            <a:pathLst>
-              <a:path w="6024154" h="6858000">
-                <a:moveTo>
-                  <a:pt x="0" y="0"/>
-                </a:moveTo>
-                <a:lnTo>
-                  <a:pt x="5953780" y="0"/>
-                </a:lnTo>
-                <a:lnTo>
-                  <a:pt x="5989880" y="284091"/>
-                </a:lnTo>
-                <a:cubicBezTo>
-                  <a:pt x="6012544" y="507260"/>
-                  <a:pt x="6024154" y="733696"/>
-                  <a:pt x="6024154" y="962844"/>
-                </a:cubicBezTo>
-                <a:cubicBezTo>
-                  <a:pt x="6024154" y="3483472"/>
-                  <a:pt x="4619336" y="5675986"/>
-                  <a:pt x="2549934" y="6800152"/>
-                </a:cubicBezTo>
-                <a:lnTo>
-                  <a:pt x="2436987" y="6858000"/>
-                </a:lnTo>
-                <a:lnTo>
-                  <a:pt x="0" y="6858000"/>
-                </a:lnTo>
-                <a:close/>
-              </a:path>
-            </a:pathLst>
-          </a:custGeom>
-          <a:noFill/>
-        </p:spPr>
-      </p:pic>
-      <p:sp>
-        <p:nvSpPr>
-          <p:cNvPr id="12292" name="Rectangle 4" hidden="1"/>
-          <p:cNvSpPr>
-            <a:spLocks noGrp="1" noChangeArrowheads="1"/>
-          </p:cNvSpPr>
-          <p:nvPr>
-            <p:ph type="title"/>
-          </p:nvPr>
-        </p:nvSpPr>
-        <p:spPr/>
-        <p:txBody>
-          <a:bodyPr/>
-          <a:lstStyle/>
-          <a:p>
-            <a:r>
-              <a:rPr lang="en-US"/>
-              <a:t>c05f11</a:t>
-            </a:r>
-          </a:p>
-        </p:txBody>
-      </p:sp>
-      <p:sp>
-        <p:nvSpPr>
-          <p:cNvPr id="7" name="Rectangle 2">
-            <a:extLst>
-              <a:ext uri="{FF2B5EF4-FFF2-40B4-BE49-F238E27FC236}">
-                <a16:creationId xmlns:a16="http://schemas.microsoft.com/office/drawing/2014/main" id="{2121E567-3F38-4329-BF69-6AAD7DED8814}"/>
-              </a:ext>
-            </a:extLst>
-          </p:cNvPr>
-          <p:cNvSpPr>
-            <a:spLocks noChangeArrowheads="1"/>
-          </p:cNvSpPr>
-          <p:nvPr/>
-        </p:nvSpPr>
-        <p:spPr bwMode="auto">
-          <a:xfrm>
-            <a:off x="5041902" y="228600"/>
-            <a:ext cx="4025897" cy="3970318"/>
-          </a:xfrm>
-          <a:prstGeom prst="rect">
-            <a:avLst/>
-          </a:prstGeom>
-          <a:noFill/>
-          <a:ln w="9525">
-            <a:noFill/>
-            <a:miter lim="800000"/>
-            <a:headEnd/>
-            <a:tailEnd/>
-          </a:ln>
-          <a:effectLst/>
-        </p:spPr>
-        <p:txBody>
-          <a:bodyPr wrap="square">
-            <a:spAutoFit/>
-          </a:bodyPr>
-          <a:lstStyle/>
-          <a:p>
-            <a:r>
-              <a:rPr lang="en-US" sz="2400" b="1" dirty="0"/>
-              <a:t>Types of imperfections in crystals</a:t>
-            </a:r>
-          </a:p>
-          <a:p>
-            <a:endParaRPr lang="en-US" sz="2400" dirty="0"/>
-          </a:p>
-          <a:p>
-            <a:r>
-              <a:rPr lang="en-US" sz="2400" dirty="0"/>
-              <a:t>- point: vacancy, interstitial</a:t>
-            </a:r>
-          </a:p>
-          <a:p>
-            <a:endParaRPr lang="en-US" sz="2400" dirty="0"/>
-          </a:p>
-          <a:p>
-            <a:r>
-              <a:rPr lang="en-US" sz="2400" dirty="0"/>
-              <a:t>- line: dislocations</a:t>
-            </a:r>
-          </a:p>
-          <a:p>
-            <a:endParaRPr lang="en-US" sz="2400" dirty="0"/>
-          </a:p>
-          <a:p>
-            <a:r>
-              <a:rPr lang="en-US" sz="2400" dirty="0"/>
-              <a:t>- interfacial: grain boundary, twin boundary</a:t>
-            </a:r>
-          </a:p>
-          <a:p>
-            <a:pPr>
-              <a:spcBef>
-                <a:spcPct val="50000"/>
-              </a:spcBef>
-            </a:pPr>
-            <a:endParaRPr lang="en-US" sz="2400" dirty="0"/>
-          </a:p>
-        </p:txBody>
-      </p:sp>
-      <p:sp>
-        <p:nvSpPr>
-          <p:cNvPr id="8" name="Rectangle 3">
-            <a:extLst>
-              <a:ext uri="{FF2B5EF4-FFF2-40B4-BE49-F238E27FC236}">
-                <a16:creationId xmlns:a16="http://schemas.microsoft.com/office/drawing/2014/main" id="{F6C3DD9E-CECC-401A-9D0B-C354BFCE06CB}"/>
-              </a:ext>
-            </a:extLst>
-          </p:cNvPr>
-          <p:cNvSpPr>
-            <a:spLocks noChangeArrowheads="1"/>
-          </p:cNvSpPr>
-          <p:nvPr/>
-        </p:nvSpPr>
-        <p:spPr bwMode="auto">
-          <a:xfrm>
-            <a:off x="4930430" y="2072326"/>
-            <a:ext cx="3146769" cy="442274"/>
-          </a:xfrm>
-          <a:prstGeom prst="rect">
-            <a:avLst/>
-          </a:prstGeom>
-          <a:noFill/>
-          <a:ln w="25400">
-            <a:solidFill>
-              <a:srgbClr val="00FFFF"/>
-            </a:solidFill>
-            <a:prstDash val="lgDash"/>
-            <a:miter lim="800000"/>
-            <a:headEnd/>
-            <a:tailEnd/>
-          </a:ln>
-          <a:effectLst/>
-        </p:spPr>
-        <p:txBody>
-          <a:bodyPr wrap="none" anchor="ctr"/>
-          <a:lstStyle/>
-          <a:p>
-            <a:endParaRPr lang="en-US"/>
-          </a:p>
-        </p:txBody>
-      </p:sp>
-    </p:spTree>
-  </p:cSld>
-  <p:clrMapOvr>
-    <a:overrideClrMapping bg1="dk1" tx1="lt1" bg2="dk2" tx2="lt2" accent1="accent1" accent2="accent2" accent3="accent3" accent4="accent4" accent5="accent5" accent6="accent6" hlink="hlink" folHlink="folHlink"/>
-  </p:clrMapOvr>
-</p:sld>
-</file>
-
-<file path=ppt/slides/slide8.xml><?xml version="1.0" encoding="utf-8"?>
-<p:sld xmlns:a="http://schemas.openxmlformats.org/drawingml/2006/main" xmlns:r="http://schemas.openxmlformats.org/officeDocument/2006/relationships" xmlns:p="http://schemas.openxmlformats.org/presentationml/2006/main">
-  <p:cSld>
-    <p:bg>
-      <p:bgPr>
-        <a:solidFill>
-          <a:schemeClr val="bg1"/>
-        </a:solidFill>
-        <a:effectLst/>
-      </p:bgPr>
-    </p:bg>
-    <p:spTree>
-      <p:nvGrpSpPr>
-        <p:cNvPr id="1" name=""/>
-        <p:cNvGrpSpPr/>
-        <p:nvPr/>
-      </p:nvGrpSpPr>
-      <p:grpSpPr>
-        <a:xfrm>
-          <a:off x="0" y="0"/>
-          <a:ext cx="0" cy="0"/>
-          <a:chOff x="0" y="0"/>
-          <a:chExt cx="0" cy="0"/>
-        </a:xfrm>
-      </p:grpSpPr>
-      <p:sp>
-        <p:nvSpPr>
-          <p:cNvPr id="34" name="Rectangle 12">
-            <a:extLst>
-              <a:ext uri="{FF2B5EF4-FFF2-40B4-BE49-F238E27FC236}">
-                <a16:creationId xmlns:a16="http://schemas.microsoft.com/office/drawing/2014/main" id="{6F79B0DD-2C63-4EE5-804F-B8E391FC1E45}"/>
-              </a:ext>
-              <a:ext uri="{C183D7F6-B498-43B3-948B-1728B52AA6E4}">
-                <adec:decorative xmlns:adec="http://schemas.microsoft.com/office/drawing/2017/decorative" val="1"/>
-              </a:ext>
-            </a:extLst>
-          </p:cNvPr>
-          <p:cNvSpPr>
-            <a:spLocks noGrp="1" noRot="1" noChangeAspect="1" noMove="1" noResize="1" noEditPoints="1" noAdjustHandles="1" noChangeArrowheads="1" noChangeShapeType="1" noTextEdit="1"/>
-          </p:cNvSpPr>
-          <p:nvPr>
-            <p:extLst>
-              <p:ext uri="{386F3935-93C4-4BCD-93E2-E3B085C9AB24}">
-                <p16:designElem xmlns:p16="http://schemas.microsoft.com/office/powerpoint/2015/main" val="1"/>
-              </p:ext>
-            </p:extLst>
-          </p:nvPr>
-        </p:nvSpPr>
-        <p:spPr>
-          <a:xfrm>
-            <a:off x="2352" y="0"/>
-            <a:ext cx="9144000" cy="6858000"/>
-          </a:xfrm>
-          <a:prstGeom prst="rect">
-            <a:avLst/>
-          </a:prstGeom>
-          <a:solidFill>
-            <a:schemeClr val="bg1">
-              <a:lumMod val="75000"/>
-              <a:alpha val="80000"/>
-            </a:schemeClr>
-          </a:solidFill>
-          <a:ln>
-            <a:noFill/>
-          </a:ln>
-        </p:spPr>
-        <p:style>
-          <a:lnRef idx="2">
-            <a:schemeClr val="accent1">
-              <a:shade val="50000"/>
-            </a:schemeClr>
-          </a:lnRef>
-          <a:fillRef idx="1">
-            <a:schemeClr val="accent1"/>
-          </a:fillRef>
-          <a:effectRef idx="0">
-            <a:schemeClr val="accent1"/>
-          </a:effectRef>
-          <a:fontRef idx="minor">
-            <a:schemeClr val="lt1"/>
-          </a:fontRef>
-        </p:style>
-        <p:txBody>
-          <a:bodyPr rtlCol="0" anchor="ctr"/>
-          <a:lstStyle/>
-          <a:p>
-            <a:pPr algn="ctr"/>
-            <a:endParaRPr lang="en-US"/>
-          </a:p>
-        </p:txBody>
-      </p:sp>
-      <p:sp>
-        <p:nvSpPr>
-          <p:cNvPr id="35" name="Rectangle 14">
-            <a:extLst>
-              <a:ext uri="{FF2B5EF4-FFF2-40B4-BE49-F238E27FC236}">
-                <a16:creationId xmlns:a16="http://schemas.microsoft.com/office/drawing/2014/main" id="{627DB8AB-CD55-4C8F-9043-52652B89231A}"/>
-              </a:ext>
-              <a:ext uri="{C183D7F6-B498-43B3-948B-1728B52AA6E4}">
-                <adec:decorative xmlns:adec="http://schemas.microsoft.com/office/drawing/2017/decorative" val="1"/>
-              </a:ext>
-            </a:extLst>
-          </p:cNvPr>
-          <p:cNvSpPr>
-            <a:spLocks noGrp="1" noRot="1" noChangeAspect="1" noMove="1" noResize="1" noEditPoints="1" noAdjustHandles="1" noChangeArrowheads="1" noChangeShapeType="1" noTextEdit="1"/>
-          </p:cNvSpPr>
-          <p:nvPr>
-            <p:extLst>
-              <p:ext uri="{386F3935-93C4-4BCD-93E2-E3B085C9AB24}">
-                <p16:designElem xmlns:p16="http://schemas.microsoft.com/office/powerpoint/2015/main" val="1"/>
-              </p:ext>
-            </p:extLst>
-          </p:nvPr>
-        </p:nvSpPr>
-        <p:spPr>
-          <a:xfrm>
-            <a:off x="482599" y="643466"/>
-            <a:ext cx="4023191" cy="2706794"/>
-          </a:xfrm>
-          <a:prstGeom prst="rect">
-            <a:avLst/>
-          </a:prstGeom>
-          <a:solidFill>
-            <a:srgbClr val="FFFFFF"/>
-          </a:solidFill>
-          <a:ln w="9525">
-            <a:noFill/>
-          </a:ln>
-          <a:effectLst>
-            <a:outerShdw blurRad="63500" dist="17780" dir="5400000" algn="t" rotWithShape="0">
-              <a:prstClr val="black">
-                <a:alpha val="43000"/>
-              </a:prstClr>
-            </a:outerShdw>
-          </a:effectLst>
-        </p:spPr>
-        <p:style>
-          <a:lnRef idx="2">
-            <a:schemeClr val="accent1">
-              <a:shade val="50000"/>
-            </a:schemeClr>
-          </a:lnRef>
-          <a:fillRef idx="1">
-            <a:schemeClr val="accent1"/>
-          </a:fillRef>
-          <a:effectRef idx="0">
-            <a:schemeClr val="accent1"/>
-          </a:effectRef>
-          <a:fontRef idx="minor">
-            <a:schemeClr val="lt1"/>
-          </a:fontRef>
-        </p:style>
-        <p:txBody>
-          <a:bodyPr rtlCol="0" anchor="ctr"/>
-          <a:lstStyle/>
-          <a:p>
-            <a:pPr algn="ctr"/>
-            <a:endParaRPr lang="en-US"/>
-          </a:p>
-        </p:txBody>
-      </p:sp>
-      <p:sp>
-        <p:nvSpPr>
-          <p:cNvPr id="36" name="Rectangle 16">
-            <a:extLst>
-              <a:ext uri="{FF2B5EF4-FFF2-40B4-BE49-F238E27FC236}">
-                <a16:creationId xmlns:a16="http://schemas.microsoft.com/office/drawing/2014/main" id="{53059C5A-91CB-4024-9B4E-20082E25C70B}"/>
-              </a:ext>
-              <a:ext uri="{C183D7F6-B498-43B3-948B-1728B52AA6E4}">
-                <adec:decorative xmlns:adec="http://schemas.microsoft.com/office/drawing/2017/decorative" val="1"/>
-              </a:ext>
-            </a:extLst>
-          </p:cNvPr>
-          <p:cNvSpPr>
-            <a:spLocks noGrp="1" noRot="1" noChangeAspect="1" noMove="1" noResize="1" noEditPoints="1" noAdjustHandles="1" noChangeArrowheads="1" noChangeShapeType="1" noTextEdit="1"/>
-          </p:cNvSpPr>
-          <p:nvPr>
-            <p:extLst>
-              <p:ext uri="{386F3935-93C4-4BCD-93E2-E3B085C9AB24}">
-                <p16:designElem xmlns:p16="http://schemas.microsoft.com/office/powerpoint/2015/main" val="1"/>
-              </p:ext>
-            </p:extLst>
-          </p:nvPr>
-        </p:nvSpPr>
-        <p:spPr>
-          <a:xfrm>
-            <a:off x="4626441" y="643466"/>
-            <a:ext cx="4032605" cy="2706794"/>
-          </a:xfrm>
-          <a:prstGeom prst="rect">
-            <a:avLst/>
-          </a:prstGeom>
-          <a:solidFill>
-            <a:srgbClr val="FFFFFF"/>
-          </a:solidFill>
-          <a:ln w="9525">
-            <a:noFill/>
-          </a:ln>
-          <a:effectLst>
-            <a:outerShdw blurRad="63500" dist="17780" dir="5400000" algn="t" rotWithShape="0">
-              <a:prstClr val="black">
-                <a:alpha val="43000"/>
-              </a:prstClr>
-            </a:outerShdw>
-          </a:effectLst>
-        </p:spPr>
-        <p:style>
-          <a:lnRef idx="2">
-            <a:schemeClr val="accent1">
-              <a:shade val="50000"/>
-            </a:schemeClr>
-          </a:lnRef>
-          <a:fillRef idx="1">
-            <a:schemeClr val="accent1"/>
-          </a:fillRef>
-          <a:effectRef idx="0">
-            <a:schemeClr val="accent1"/>
-          </a:effectRef>
-          <a:fontRef idx="minor">
-            <a:schemeClr val="lt1"/>
-          </a:fontRef>
-        </p:style>
-        <p:txBody>
-          <a:bodyPr rtlCol="0" anchor="ctr"/>
-          <a:lstStyle/>
-          <a:p>
-            <a:pPr algn="ctr"/>
-            <a:endParaRPr lang="en-US"/>
-          </a:p>
-        </p:txBody>
-      </p:sp>
-      <p:pic>
-        <p:nvPicPr>
-          <p:cNvPr id="7" name="TheoreticalStrength.mpg">
-            <a:hlinkClick r:id="" action="ppaction://media"/>
-            <a:extLst>
-              <a:ext uri="{FF2B5EF4-FFF2-40B4-BE49-F238E27FC236}">
-                <a16:creationId xmlns:a16="http://schemas.microsoft.com/office/drawing/2014/main" id="{D00487CB-E47C-496B-A767-4E667BC60CB3}"/>
-              </a:ext>
-            </a:extLst>
-          </p:cNvPr>
-          <p:cNvPicPr>
-            <a:picLocks noChangeAspect="1"/>
-          </p:cNvPicPr>
-          <p:nvPr>
-            <a:videoFile r:link="rId2"/>
-            <p:extLst>
-              <p:ext uri="{DAA4B4D4-6D71-4841-9C94-3DE7FCFB9230}">
-                <p14:media xmlns:p14="http://schemas.microsoft.com/office/powerpoint/2010/main" r:embed="rId1"/>
-              </p:ext>
-            </p:extLst>
-          </p:nvPr>
-        </p:nvPicPr>
-        <p:blipFill rotWithShape="1">
-          <a:blip r:embed="rId9" cstate="print"/>
-          <a:srcRect l="6266" t="11186" r="2689" b="17177"/>
-          <a:stretch/>
-        </p:blipFill>
-        <p:spPr>
-          <a:xfrm>
-            <a:off x="893756" y="966713"/>
-            <a:ext cx="3200400" cy="2060298"/>
-          </a:xfrm>
-          <a:prstGeom prst="rect">
-            <a:avLst/>
-          </a:prstGeom>
-        </p:spPr>
-      </p:pic>
-      <p:sp>
-        <p:nvSpPr>
-          <p:cNvPr id="37" name="Rectangle 18">
-            <a:extLst>
-              <a:ext uri="{FF2B5EF4-FFF2-40B4-BE49-F238E27FC236}">
-                <a16:creationId xmlns:a16="http://schemas.microsoft.com/office/drawing/2014/main" id="{184884BF-A898-4EFF-9504-E13EBE3FF62E}"/>
-              </a:ext>
-              <a:ext uri="{C183D7F6-B498-43B3-948B-1728B52AA6E4}">
-                <adec:decorative xmlns:adec="http://schemas.microsoft.com/office/drawing/2017/decorative" val="1"/>
-              </a:ext>
-            </a:extLst>
-          </p:cNvPr>
-          <p:cNvSpPr>
-            <a:spLocks noGrp="1" noRot="1" noChangeAspect="1" noMove="1" noResize="1" noEditPoints="1" noAdjustHandles="1" noChangeArrowheads="1" noChangeShapeType="1" noTextEdit="1"/>
-          </p:cNvSpPr>
-          <p:nvPr>
-            <p:extLst>
-              <p:ext uri="{386F3935-93C4-4BCD-93E2-E3B085C9AB24}">
-                <p16:designElem xmlns:p16="http://schemas.microsoft.com/office/powerpoint/2015/main" val="1"/>
-              </p:ext>
-            </p:extLst>
-          </p:nvPr>
-        </p:nvSpPr>
-        <p:spPr>
-          <a:xfrm>
-            <a:off x="482599" y="3514513"/>
-            <a:ext cx="4023191" cy="2703406"/>
-          </a:xfrm>
-          <a:prstGeom prst="rect">
-            <a:avLst/>
-          </a:prstGeom>
-          <a:solidFill>
-            <a:srgbClr val="FFFFFF"/>
-          </a:solidFill>
-          <a:ln w="9525">
-            <a:noFill/>
-          </a:ln>
-          <a:effectLst>
-            <a:outerShdw blurRad="63500" dist="17780" dir="5400000" algn="t" rotWithShape="0">
-              <a:prstClr val="black">
-                <a:alpha val="43000"/>
-              </a:prstClr>
-            </a:outerShdw>
-          </a:effectLst>
-        </p:spPr>
-        <p:style>
-          <a:lnRef idx="2">
-            <a:schemeClr val="accent1">
-              <a:shade val="50000"/>
-            </a:schemeClr>
-          </a:lnRef>
-          <a:fillRef idx="1">
-            <a:schemeClr val="accent1"/>
-          </a:fillRef>
-          <a:effectRef idx="0">
-            <a:schemeClr val="accent1"/>
-          </a:effectRef>
-          <a:fontRef idx="minor">
-            <a:schemeClr val="lt1"/>
-          </a:fontRef>
-        </p:style>
-        <p:txBody>
-          <a:bodyPr rtlCol="0" anchor="ctr"/>
-          <a:lstStyle/>
-          <a:p>
-            <a:pPr algn="ctr"/>
-            <a:endParaRPr lang="en-US"/>
-          </a:p>
-        </p:txBody>
-      </p:sp>
-      <p:sp>
-        <p:nvSpPr>
-          <p:cNvPr id="38" name="Rectangle 20">
-            <a:extLst>
-              <a:ext uri="{FF2B5EF4-FFF2-40B4-BE49-F238E27FC236}">
-                <a16:creationId xmlns:a16="http://schemas.microsoft.com/office/drawing/2014/main" id="{7B32D337-FDA6-4468-ADB1-7038E5FC0BA9}"/>
-              </a:ext>
-              <a:ext uri="{C183D7F6-B498-43B3-948B-1728B52AA6E4}">
-                <adec:decorative xmlns:adec="http://schemas.microsoft.com/office/drawing/2017/decorative" val="1"/>
-              </a:ext>
-            </a:extLst>
-          </p:cNvPr>
-          <p:cNvSpPr>
-            <a:spLocks noGrp="1" noRot="1" noChangeAspect="1" noMove="1" noResize="1" noEditPoints="1" noAdjustHandles="1" noChangeArrowheads="1" noChangeShapeType="1" noTextEdit="1"/>
-          </p:cNvSpPr>
-          <p:nvPr>
-            <p:extLst>
-              <p:ext uri="{386F3935-93C4-4BCD-93E2-E3B085C9AB24}">
-                <p16:designElem xmlns:p16="http://schemas.microsoft.com/office/powerpoint/2015/main" val="1"/>
-              </p:ext>
-            </p:extLst>
-          </p:nvPr>
-        </p:nvSpPr>
-        <p:spPr>
-          <a:xfrm>
-            <a:off x="4626441" y="3514513"/>
-            <a:ext cx="4032605" cy="2706794"/>
-          </a:xfrm>
-          <a:prstGeom prst="rect">
-            <a:avLst/>
-          </a:prstGeom>
-          <a:solidFill>
-            <a:srgbClr val="FFFFFF"/>
-          </a:solidFill>
-          <a:ln w="9525">
-            <a:noFill/>
-          </a:ln>
-          <a:effectLst>
-            <a:outerShdw blurRad="63500" dist="17780" dir="5400000" algn="t" rotWithShape="0">
-              <a:prstClr val="black">
-                <a:alpha val="43000"/>
-              </a:prstClr>
-            </a:outerShdw>
-          </a:effectLst>
-        </p:spPr>
-        <p:style>
-          <a:lnRef idx="2">
-            <a:schemeClr val="accent1">
-              <a:shade val="50000"/>
-            </a:schemeClr>
-          </a:lnRef>
-          <a:fillRef idx="1">
-            <a:schemeClr val="accent1"/>
-          </a:fillRef>
-          <a:effectRef idx="0">
-            <a:schemeClr val="accent1"/>
-          </a:effectRef>
-          <a:fontRef idx="minor">
-            <a:schemeClr val="lt1"/>
-          </a:fontRef>
-        </p:style>
-        <p:txBody>
-          <a:bodyPr rtlCol="0" anchor="ctr"/>
-          <a:lstStyle/>
-          <a:p>
-            <a:pPr algn="ctr"/>
-            <a:endParaRPr lang="en-US"/>
-          </a:p>
-        </p:txBody>
-      </p:sp>
-      <p:pic>
-        <p:nvPicPr>
-          <p:cNvPr id="8" name="edge under shear.mpg">
-            <a:hlinkClick r:id="" action="ppaction://media"/>
-            <a:extLst>
-              <a:ext uri="{FF2B5EF4-FFF2-40B4-BE49-F238E27FC236}">
-                <a16:creationId xmlns:a16="http://schemas.microsoft.com/office/drawing/2014/main" id="{0C0F8B3E-54AA-4F60-BB26-FDE496C6343C}"/>
-              </a:ext>
-            </a:extLst>
-          </p:cNvPr>
-          <p:cNvPicPr>
-            <a:picLocks noChangeAspect="1"/>
-          </p:cNvPicPr>
-          <p:nvPr>
-            <a:videoFile r:link="rId4"/>
-            <p:extLst>
-              <p:ext uri="{DAA4B4D4-6D71-4841-9C94-3DE7FCFB9230}">
-                <p14:media xmlns:p14="http://schemas.microsoft.com/office/powerpoint/2010/main" r:embed="rId3"/>
-              </p:ext>
-            </p:extLst>
-          </p:nvPr>
-        </p:nvPicPr>
-        <p:blipFill>
-          <a:blip r:embed="rId10" cstate="print"/>
-          <a:stretch>
-            <a:fillRect/>
-          </a:stretch>
-        </p:blipFill>
-        <p:spPr>
-          <a:xfrm>
-            <a:off x="5272612" y="831710"/>
-            <a:ext cx="2848151" cy="2330305"/>
-          </a:xfrm>
-          <a:prstGeom prst="rect">
-            <a:avLst/>
-          </a:prstGeom>
-        </p:spPr>
-      </p:pic>
-      <p:pic>
-        <p:nvPicPr>
-          <p:cNvPr id="2" name="Online Media 1" title="Dislocation glide">
-            <a:hlinkClick r:id="" action="ppaction://media"/>
-            <a:extLst>
-              <a:ext uri="{FF2B5EF4-FFF2-40B4-BE49-F238E27FC236}">
-                <a16:creationId xmlns:a16="http://schemas.microsoft.com/office/drawing/2014/main" id="{4BE029CA-7D88-4D8C-AEBA-DC117C83BE0C}"/>
-              </a:ext>
-            </a:extLst>
-          </p:cNvPr>
-          <p:cNvPicPr>
-            <a:picLocks noRot="1" noChangeAspect="1"/>
-          </p:cNvPicPr>
-          <p:nvPr>
-            <a:videoFile r:link="rId5"/>
-          </p:nvPr>
-        </p:nvPicPr>
-        <p:blipFill>
-          <a:blip r:embed="rId11"/>
-          <a:stretch>
-            <a:fillRect/>
-          </a:stretch>
-        </p:blipFill>
-        <p:spPr>
-          <a:xfrm>
-            <a:off x="304800" y="135748"/>
-            <a:ext cx="7711673" cy="5783755"/>
-          </a:xfrm>
-          <a:prstGeom prst="rect">
-            <a:avLst/>
-          </a:prstGeom>
-        </p:spPr>
-      </p:pic>
-      <p:pic>
-        <p:nvPicPr>
-          <p:cNvPr id="4" name="Online Media 1" title="Bubble Raft Model - part 1">
-            <a:hlinkClick r:id="" action="ppaction://media"/>
-            <a:extLst>
-              <a:ext uri="{FF2B5EF4-FFF2-40B4-BE49-F238E27FC236}">
-                <a16:creationId xmlns:a16="http://schemas.microsoft.com/office/drawing/2014/main" id="{7C9C8180-0FA4-4A6A-818D-07E82D35ED37}"/>
-              </a:ext>
-            </a:extLst>
-          </p:cNvPr>
-          <p:cNvPicPr>
-            <a:picLocks noRot="1" noChangeAspect="1"/>
-          </p:cNvPicPr>
-          <p:nvPr>
-            <a:videoFile r:link="rId6"/>
-          </p:nvPr>
-        </p:nvPicPr>
-        <p:blipFill>
-          <a:blip r:embed="rId12"/>
-          <a:stretch>
-            <a:fillRect/>
-          </a:stretch>
-        </p:blipFill>
-        <p:spPr>
-          <a:xfrm>
-            <a:off x="1120424" y="3810000"/>
-            <a:ext cx="2781820" cy="2086365"/>
-          </a:xfrm>
-          <a:prstGeom prst="rect">
-            <a:avLst/>
-          </a:prstGeom>
-        </p:spPr>
-      </p:pic>
-    </p:spTree>
-    <p:extLst>
-      <p:ext uri="{BB962C8B-B14F-4D97-AF65-F5344CB8AC3E}">
-        <p14:creationId xmlns:p14="http://schemas.microsoft.com/office/powerpoint/2010/main" val="2198078673"/>
-      </p:ext>
-    </p:extLst>
-  </p:cSld>
-  <p:clrMapOvr>
-    <a:masterClrMapping/>
-  </p:clrMapOvr>
-  <p:timing>
-    <p:tnLst>
-      <p:par>
-        <p:cTn id="1" dur="indefinite" restart="never" nodeType="tmRoot">
-          <p:childTnLst>
-            <p:video>
-              <p:cMediaNode vol="80000">
-                <p:cTn id="2" fill="hold" display="0">
-                  <p:stCondLst>
-                    <p:cond delay="indefinite"/>
-                  </p:stCondLst>
-                </p:cTn>
-                <p:tgtEl>
-                  <p:spTgt spid="2"/>
-                </p:tgtEl>
-              </p:cMediaNode>
-            </p:video>
-            <p:video>
-              <p:cMediaNode vol="80000">
-                <p:cTn id="3" fill="hold" display="0">
-                  <p:stCondLst>
-                    <p:cond delay="indefinite"/>
-                  </p:stCondLst>
-                </p:cTn>
-                <p:tgtEl>
-                  <p:spTgt spid="4"/>
-                </p:tgtEl>
-              </p:cMediaNode>
-            </p:video>
-            <p:video>
-              <p:cMediaNode>
-                <p:cTn id="4" fill="hold" display="0">
-                  <p:stCondLst>
-                    <p:cond delay="indefinite"/>
-                  </p:stCondLst>
-                  <p:endCondLst>
-                    <p:cond evt="onNext" delay="0">
-                      <p:tgtEl>
-                        <p:sldTgt/>
-                      </p:tgtEl>
-                    </p:cond>
-                    <p:cond evt="onPrev" delay="0">
-                      <p:tgtEl>
-                        <p:sldTgt/>
-                      </p:tgtEl>
-                    </p:cond>
-                  </p:endCondLst>
-                </p:cTn>
-                <p:tgtEl>
-                  <p:spTgt spid="7"/>
-                </p:tgtEl>
-              </p:cMediaNode>
-            </p:video>
-            <p:video>
-              <p:cMediaNode>
-                <p:cTn id="5" fill="hold" display="0">
-                  <p:stCondLst>
-                    <p:cond delay="indefinite"/>
-                  </p:stCondLst>
-                  <p:endCondLst>
-                    <p:cond evt="onNext" delay="0">
-                      <p:tgtEl>
-                        <p:sldTgt/>
-                      </p:tgtEl>
-                    </p:cond>
-                    <p:cond evt="onPrev" delay="0">
-                      <p:tgtEl>
-                        <p:sldTgt/>
-                      </p:tgtEl>
-                    </p:cond>
-                  </p:endCondLst>
-                </p:cTn>
-                <p:tgtEl>
-                  <p:spTgt spid="8"/>
-                </p:tgtEl>
-              </p:cMediaNode>
-            </p:video>
-          </p:childTnLst>
-        </p:cTn>
-      </p:par>
-    </p:tnLst>
-  </p:timing>
-</p:sld>
-</file>
-
-<file path=ppt/slides/slide9.xml><?xml version="1.0" encoding="utf-8"?>
-<p:sld xmlns:a="http://schemas.openxmlformats.org/drawingml/2006/main" xmlns:r="http://schemas.openxmlformats.org/officeDocument/2006/relationships" xmlns:p="http://schemas.openxmlformats.org/presentationml/2006/main">
-  <p:cSld>
-    <p:bg>
-      <p:bgPr>
-        <a:solidFill>
-          <a:schemeClr val="bg1"/>
-        </a:solidFill>
-        <a:effectLst/>
-      </p:bgPr>
-    </p:bg>
-    <p:spTree>
-      <p:nvGrpSpPr>
-        <p:cNvPr id="1" name=""/>
-        <p:cNvGrpSpPr/>
-        <p:nvPr/>
-      </p:nvGrpSpPr>
-      <p:grpSpPr>
-        <a:xfrm>
-          <a:off x="0" y="0"/>
-          <a:ext cx="0" cy="0"/>
-          <a:chOff x="0" y="0"/>
-          <a:chExt cx="0" cy="0"/>
-        </a:xfrm>
-      </p:grpSpPr>
-      <p:sp>
-        <p:nvSpPr>
-          <p:cNvPr id="34" name="Rectangle 12">
-            <a:extLst>
-              <a:ext uri="{FF2B5EF4-FFF2-40B4-BE49-F238E27FC236}">
-                <a16:creationId xmlns:a16="http://schemas.microsoft.com/office/drawing/2014/main" id="{6F79B0DD-2C63-4EE5-804F-B8E391FC1E45}"/>
-              </a:ext>
-              <a:ext uri="{C183D7F6-B498-43B3-948B-1728B52AA6E4}">
-                <adec:decorative xmlns:adec="http://schemas.microsoft.com/office/drawing/2017/decorative" val="1"/>
-              </a:ext>
-            </a:extLst>
-          </p:cNvPr>
-          <p:cNvSpPr>
-            <a:spLocks noGrp="1" noRot="1" noChangeAspect="1" noMove="1" noResize="1" noEditPoints="1" noAdjustHandles="1" noChangeArrowheads="1" noChangeShapeType="1" noTextEdit="1"/>
-          </p:cNvSpPr>
-          <p:nvPr>
-            <p:extLst>
-              <p:ext uri="{386F3935-93C4-4BCD-93E2-E3B085C9AB24}">
-                <p16:designElem xmlns:p16="http://schemas.microsoft.com/office/powerpoint/2015/main" val="1"/>
-              </p:ext>
-            </p:extLst>
-          </p:nvPr>
-        </p:nvSpPr>
-        <p:spPr>
-          <a:xfrm>
-            <a:off x="2352" y="0"/>
-            <a:ext cx="9144000" cy="6858000"/>
-          </a:xfrm>
-          <a:prstGeom prst="rect">
-            <a:avLst/>
-          </a:prstGeom>
-          <a:solidFill>
-            <a:schemeClr val="bg1">
-              <a:lumMod val="75000"/>
-              <a:alpha val="80000"/>
-            </a:schemeClr>
-          </a:solidFill>
-          <a:ln>
-            <a:noFill/>
-          </a:ln>
-        </p:spPr>
-        <p:style>
-          <a:lnRef idx="2">
-            <a:schemeClr val="accent1">
-              <a:shade val="50000"/>
-            </a:schemeClr>
-          </a:lnRef>
-          <a:fillRef idx="1">
-            <a:schemeClr val="accent1"/>
-          </a:fillRef>
-          <a:effectRef idx="0">
-            <a:schemeClr val="accent1"/>
-          </a:effectRef>
-          <a:fontRef idx="minor">
-            <a:schemeClr val="lt1"/>
-          </a:fontRef>
-        </p:style>
-        <p:txBody>
-          <a:bodyPr rtlCol="0" anchor="ctr"/>
-          <a:lstStyle/>
-          <a:p>
-            <a:pPr algn="ctr"/>
-            <a:endParaRPr lang="en-US"/>
-          </a:p>
-        </p:txBody>
-      </p:sp>
-      <p:sp>
-        <p:nvSpPr>
-          <p:cNvPr id="35" name="Rectangle 14">
-            <a:extLst>
-              <a:ext uri="{FF2B5EF4-FFF2-40B4-BE49-F238E27FC236}">
-                <a16:creationId xmlns:a16="http://schemas.microsoft.com/office/drawing/2014/main" id="{627DB8AB-CD55-4C8F-9043-52652B89231A}"/>
-              </a:ext>
-              <a:ext uri="{C183D7F6-B498-43B3-948B-1728B52AA6E4}">
-                <adec:decorative xmlns:adec="http://schemas.microsoft.com/office/drawing/2017/decorative" val="1"/>
-              </a:ext>
-            </a:extLst>
-          </p:cNvPr>
-          <p:cNvSpPr>
-            <a:spLocks noGrp="1" noRot="1" noChangeAspect="1" noMove="1" noResize="1" noEditPoints="1" noAdjustHandles="1" noChangeArrowheads="1" noChangeShapeType="1" noTextEdit="1"/>
-          </p:cNvSpPr>
-          <p:nvPr>
-            <p:extLst>
-              <p:ext uri="{386F3935-93C4-4BCD-93E2-E3B085C9AB24}">
-                <p16:designElem xmlns:p16="http://schemas.microsoft.com/office/powerpoint/2015/main" val="1"/>
-              </p:ext>
-            </p:extLst>
-          </p:nvPr>
-        </p:nvSpPr>
-        <p:spPr>
-          <a:xfrm>
-            <a:off x="482599" y="643466"/>
-            <a:ext cx="4023191" cy="2706794"/>
-          </a:xfrm>
-          <a:prstGeom prst="rect">
-            <a:avLst/>
-          </a:prstGeom>
-          <a:solidFill>
-            <a:srgbClr val="FFFFFF"/>
-          </a:solidFill>
-          <a:ln w="9525">
-            <a:noFill/>
-          </a:ln>
-          <a:effectLst>
-            <a:outerShdw blurRad="63500" dist="17780" dir="5400000" algn="t" rotWithShape="0">
-              <a:prstClr val="black">
-                <a:alpha val="43000"/>
-              </a:prstClr>
-            </a:outerShdw>
-          </a:effectLst>
-        </p:spPr>
-        <p:style>
-          <a:lnRef idx="2">
-            <a:schemeClr val="accent1">
-              <a:shade val="50000"/>
-            </a:schemeClr>
-          </a:lnRef>
-          <a:fillRef idx="1">
-            <a:schemeClr val="accent1"/>
-          </a:fillRef>
-          <a:effectRef idx="0">
-            <a:schemeClr val="accent1"/>
-          </a:effectRef>
-          <a:fontRef idx="minor">
-            <a:schemeClr val="lt1"/>
-          </a:fontRef>
-        </p:style>
-        <p:txBody>
-          <a:bodyPr rtlCol="0" anchor="ctr"/>
-          <a:lstStyle/>
-          <a:p>
-            <a:pPr algn="ctr"/>
-            <a:endParaRPr lang="en-US"/>
-          </a:p>
-        </p:txBody>
-      </p:sp>
-      <p:sp>
-        <p:nvSpPr>
-          <p:cNvPr id="36" name="Rectangle 16">
-            <a:extLst>
-              <a:ext uri="{FF2B5EF4-FFF2-40B4-BE49-F238E27FC236}">
-                <a16:creationId xmlns:a16="http://schemas.microsoft.com/office/drawing/2014/main" id="{53059C5A-91CB-4024-9B4E-20082E25C70B}"/>
-              </a:ext>
-              <a:ext uri="{C183D7F6-B498-43B3-948B-1728B52AA6E4}">
-                <adec:decorative xmlns:adec="http://schemas.microsoft.com/office/drawing/2017/decorative" val="1"/>
-              </a:ext>
-            </a:extLst>
-          </p:cNvPr>
-          <p:cNvSpPr>
-            <a:spLocks noGrp="1" noRot="1" noChangeAspect="1" noMove="1" noResize="1" noEditPoints="1" noAdjustHandles="1" noChangeArrowheads="1" noChangeShapeType="1" noTextEdit="1"/>
-          </p:cNvSpPr>
-          <p:nvPr>
-            <p:extLst>
-              <p:ext uri="{386F3935-93C4-4BCD-93E2-E3B085C9AB24}">
-                <p16:designElem xmlns:p16="http://schemas.microsoft.com/office/powerpoint/2015/main" val="1"/>
-              </p:ext>
-            </p:extLst>
-          </p:nvPr>
-        </p:nvSpPr>
-        <p:spPr>
-          <a:xfrm>
-            <a:off x="4626441" y="643466"/>
-            <a:ext cx="4032605" cy="2706794"/>
-          </a:xfrm>
-          <a:prstGeom prst="rect">
-            <a:avLst/>
-          </a:prstGeom>
-          <a:solidFill>
-            <a:srgbClr val="FFFFFF"/>
-          </a:solidFill>
-          <a:ln w="9525">
-            <a:noFill/>
-          </a:ln>
-          <a:effectLst>
-            <a:outerShdw blurRad="63500" dist="17780" dir="5400000" algn="t" rotWithShape="0">
-              <a:prstClr val="black">
-                <a:alpha val="43000"/>
-              </a:prstClr>
-            </a:outerShdw>
-          </a:effectLst>
-        </p:spPr>
-        <p:style>
-          <a:lnRef idx="2">
-            <a:schemeClr val="accent1">
-              <a:shade val="50000"/>
-            </a:schemeClr>
-          </a:lnRef>
-          <a:fillRef idx="1">
-            <a:schemeClr val="accent1"/>
-          </a:fillRef>
-          <a:effectRef idx="0">
-            <a:schemeClr val="accent1"/>
-          </a:effectRef>
-          <a:fontRef idx="minor">
-            <a:schemeClr val="lt1"/>
-          </a:fontRef>
-        </p:style>
-        <p:txBody>
-          <a:bodyPr rtlCol="0" anchor="ctr"/>
-          <a:lstStyle/>
-          <a:p>
-            <a:pPr algn="ctr"/>
-            <a:endParaRPr lang="en-US"/>
-          </a:p>
-        </p:txBody>
-      </p:sp>
-      <p:pic>
-        <p:nvPicPr>
-          <p:cNvPr id="7" name="TheoreticalStrength.mpg">
-            <a:hlinkClick r:id="" action="ppaction://media"/>
-            <a:extLst>
-              <a:ext uri="{FF2B5EF4-FFF2-40B4-BE49-F238E27FC236}">
-                <a16:creationId xmlns:a16="http://schemas.microsoft.com/office/drawing/2014/main" id="{D00487CB-E47C-496B-A767-4E667BC60CB3}"/>
-              </a:ext>
-            </a:extLst>
-          </p:cNvPr>
-          <p:cNvPicPr>
-            <a:picLocks noChangeAspect="1"/>
-          </p:cNvPicPr>
-          <p:nvPr>
-            <a:videoFile r:link="rId2"/>
-            <p:extLst>
-              <p:ext uri="{DAA4B4D4-6D71-4841-9C94-3DE7FCFB9230}">
-                <p14:media xmlns:p14="http://schemas.microsoft.com/office/powerpoint/2010/main" r:embed="rId1"/>
-              </p:ext>
-            </p:extLst>
-          </p:nvPr>
-        </p:nvPicPr>
-        <p:blipFill rotWithShape="1">
-          <a:blip r:embed="rId9" cstate="print"/>
-          <a:srcRect l="6266" t="11186" r="2689" b="17177"/>
-          <a:stretch/>
-        </p:blipFill>
-        <p:spPr>
-          <a:xfrm>
-            <a:off x="893756" y="966713"/>
-            <a:ext cx="3200400" cy="2060298"/>
-          </a:xfrm>
-          <a:prstGeom prst="rect">
-            <a:avLst/>
-          </a:prstGeom>
-        </p:spPr>
-      </p:pic>
-      <p:sp>
-        <p:nvSpPr>
-          <p:cNvPr id="37" name="Rectangle 18">
-            <a:extLst>
-              <a:ext uri="{FF2B5EF4-FFF2-40B4-BE49-F238E27FC236}">
-                <a16:creationId xmlns:a16="http://schemas.microsoft.com/office/drawing/2014/main" id="{184884BF-A898-4EFF-9504-E13EBE3FF62E}"/>
-              </a:ext>
-              <a:ext uri="{C183D7F6-B498-43B3-948B-1728B52AA6E4}">
-                <adec:decorative xmlns:adec="http://schemas.microsoft.com/office/drawing/2017/decorative" val="1"/>
-              </a:ext>
-            </a:extLst>
-          </p:cNvPr>
-          <p:cNvSpPr>
-            <a:spLocks noGrp="1" noRot="1" noChangeAspect="1" noMove="1" noResize="1" noEditPoints="1" noAdjustHandles="1" noChangeArrowheads="1" noChangeShapeType="1" noTextEdit="1"/>
-          </p:cNvSpPr>
-          <p:nvPr>
-            <p:extLst>
-              <p:ext uri="{386F3935-93C4-4BCD-93E2-E3B085C9AB24}">
-                <p16:designElem xmlns:p16="http://schemas.microsoft.com/office/powerpoint/2015/main" val="1"/>
-              </p:ext>
-            </p:extLst>
-          </p:nvPr>
-        </p:nvSpPr>
-        <p:spPr>
-          <a:xfrm>
-            <a:off x="482599" y="3514513"/>
-            <a:ext cx="4023191" cy="2703406"/>
-          </a:xfrm>
-          <a:prstGeom prst="rect">
-            <a:avLst/>
-          </a:prstGeom>
-          <a:solidFill>
-            <a:srgbClr val="FFFFFF"/>
-          </a:solidFill>
-          <a:ln w="9525">
-            <a:noFill/>
-          </a:ln>
-          <a:effectLst>
-            <a:outerShdw blurRad="63500" dist="17780" dir="5400000" algn="t" rotWithShape="0">
-              <a:prstClr val="black">
-                <a:alpha val="43000"/>
-              </a:prstClr>
-            </a:outerShdw>
-          </a:effectLst>
-        </p:spPr>
-        <p:style>
-          <a:lnRef idx="2">
-            <a:schemeClr val="accent1">
-              <a:shade val="50000"/>
-            </a:schemeClr>
-          </a:lnRef>
-          <a:fillRef idx="1">
-            <a:schemeClr val="accent1"/>
-          </a:fillRef>
-          <a:effectRef idx="0">
-            <a:schemeClr val="accent1"/>
-          </a:effectRef>
-          <a:fontRef idx="minor">
-            <a:schemeClr val="lt1"/>
-          </a:fontRef>
-        </p:style>
-        <p:txBody>
-          <a:bodyPr rtlCol="0" anchor="ctr"/>
-          <a:lstStyle/>
-          <a:p>
-            <a:pPr algn="ctr"/>
-            <a:endParaRPr lang="en-US"/>
-          </a:p>
-        </p:txBody>
-      </p:sp>
-      <p:sp>
-        <p:nvSpPr>
-          <p:cNvPr id="38" name="Rectangle 20">
-            <a:extLst>
-              <a:ext uri="{FF2B5EF4-FFF2-40B4-BE49-F238E27FC236}">
-                <a16:creationId xmlns:a16="http://schemas.microsoft.com/office/drawing/2014/main" id="{7B32D337-FDA6-4468-ADB1-7038E5FC0BA9}"/>
-              </a:ext>
-              <a:ext uri="{C183D7F6-B498-43B3-948B-1728B52AA6E4}">
-                <adec:decorative xmlns:adec="http://schemas.microsoft.com/office/drawing/2017/decorative" val="1"/>
-              </a:ext>
-            </a:extLst>
-          </p:cNvPr>
-          <p:cNvSpPr>
-            <a:spLocks noGrp="1" noRot="1" noChangeAspect="1" noMove="1" noResize="1" noEditPoints="1" noAdjustHandles="1" noChangeArrowheads="1" noChangeShapeType="1" noTextEdit="1"/>
-          </p:cNvSpPr>
-          <p:nvPr>
-            <p:extLst>
-              <p:ext uri="{386F3935-93C4-4BCD-93E2-E3B085C9AB24}">
-                <p16:designElem xmlns:p16="http://schemas.microsoft.com/office/powerpoint/2015/main" val="1"/>
-              </p:ext>
-            </p:extLst>
-          </p:nvPr>
-        </p:nvSpPr>
-        <p:spPr>
-          <a:xfrm>
-            <a:off x="4626441" y="3514513"/>
-            <a:ext cx="4032605" cy="2706794"/>
-          </a:xfrm>
-          <a:prstGeom prst="rect">
-            <a:avLst/>
-          </a:prstGeom>
-          <a:solidFill>
-            <a:srgbClr val="FFFFFF"/>
-          </a:solidFill>
-          <a:ln w="9525">
-            <a:noFill/>
-          </a:ln>
-          <a:effectLst>
-            <a:outerShdw blurRad="63500" dist="17780" dir="5400000" algn="t" rotWithShape="0">
-              <a:prstClr val="black">
-                <a:alpha val="43000"/>
-              </a:prstClr>
-            </a:outerShdw>
-          </a:effectLst>
-        </p:spPr>
-        <p:style>
-          <a:lnRef idx="2">
-            <a:schemeClr val="accent1">
-              <a:shade val="50000"/>
-            </a:schemeClr>
-          </a:lnRef>
-          <a:fillRef idx="1">
-            <a:schemeClr val="accent1"/>
-          </a:fillRef>
-          <a:effectRef idx="0">
-            <a:schemeClr val="accent1"/>
-          </a:effectRef>
-          <a:fontRef idx="minor">
-            <a:schemeClr val="lt1"/>
-          </a:fontRef>
-        </p:style>
-        <p:txBody>
-          <a:bodyPr rtlCol="0" anchor="ctr"/>
-          <a:lstStyle/>
-          <a:p>
-            <a:pPr algn="ctr"/>
-            <a:endParaRPr lang="en-US"/>
-          </a:p>
-        </p:txBody>
-      </p:sp>
-      <p:pic>
-        <p:nvPicPr>
-          <p:cNvPr id="2" name="Online Media 1" title="Dislocation glide">
-            <a:hlinkClick r:id="" action="ppaction://media"/>
-            <a:extLst>
-              <a:ext uri="{FF2B5EF4-FFF2-40B4-BE49-F238E27FC236}">
-                <a16:creationId xmlns:a16="http://schemas.microsoft.com/office/drawing/2014/main" id="{4BE029CA-7D88-4D8C-AEBA-DC117C83BE0C}"/>
-              </a:ext>
-            </a:extLst>
-          </p:cNvPr>
-          <p:cNvPicPr>
-            <a:picLocks noRot="1" noChangeAspect="1"/>
-          </p:cNvPicPr>
-          <p:nvPr>
-            <a:videoFile r:link="rId3"/>
-          </p:nvPr>
-        </p:nvPicPr>
-        <p:blipFill>
-          <a:blip r:embed="rId10"/>
-          <a:stretch>
-            <a:fillRect/>
-          </a:stretch>
-        </p:blipFill>
-        <p:spPr>
-          <a:xfrm>
-            <a:off x="5269409" y="3859205"/>
-            <a:ext cx="2747064" cy="2060298"/>
-          </a:xfrm>
-          <a:prstGeom prst="rect">
-            <a:avLst/>
-          </a:prstGeom>
-        </p:spPr>
-      </p:pic>
-      <p:pic>
-        <p:nvPicPr>
-          <p:cNvPr id="8" name="edge under shear.mpg">
-            <a:hlinkClick r:id="" action="ppaction://media"/>
-            <a:extLst>
-              <a:ext uri="{FF2B5EF4-FFF2-40B4-BE49-F238E27FC236}">
-                <a16:creationId xmlns:a16="http://schemas.microsoft.com/office/drawing/2014/main" id="{0C0F8B3E-54AA-4F60-BB26-FDE496C6343C}"/>
-              </a:ext>
-            </a:extLst>
-          </p:cNvPr>
-          <p:cNvPicPr>
-            <a:picLocks noChangeAspect="1"/>
-          </p:cNvPicPr>
-          <p:nvPr>
-            <a:videoFile r:link="rId5"/>
-            <p:extLst>
-              <p:ext uri="{DAA4B4D4-6D71-4841-9C94-3DE7FCFB9230}">
-                <p14:media xmlns:p14="http://schemas.microsoft.com/office/powerpoint/2010/main" r:embed="rId4"/>
-              </p:ext>
-            </p:extLst>
-          </p:nvPr>
-        </p:nvPicPr>
-        <p:blipFill>
-          <a:blip r:embed="rId11" cstate="print"/>
-          <a:stretch>
-            <a:fillRect/>
-          </a:stretch>
-        </p:blipFill>
-        <p:spPr>
-          <a:xfrm>
-            <a:off x="5272612" y="831710"/>
-            <a:ext cx="2848151" cy="2330305"/>
-          </a:xfrm>
-          <a:prstGeom prst="rect">
-            <a:avLst/>
-          </a:prstGeom>
-        </p:spPr>
-      </p:pic>
-      <p:pic>
-        <p:nvPicPr>
-          <p:cNvPr id="4" name="Online Media 1" title="Bubble Raft Model - part 1">
-            <a:hlinkClick r:id="" action="ppaction://media"/>
-            <a:extLst>
-              <a:ext uri="{FF2B5EF4-FFF2-40B4-BE49-F238E27FC236}">
-                <a16:creationId xmlns:a16="http://schemas.microsoft.com/office/drawing/2014/main" id="{7C9C8180-0FA4-4A6A-818D-07E82D35ED37}"/>
-              </a:ext>
-            </a:extLst>
-          </p:cNvPr>
-          <p:cNvPicPr>
-            <a:picLocks noRot="1" noChangeAspect="1"/>
-          </p:cNvPicPr>
-          <p:nvPr>
-            <a:videoFile r:link="rId6"/>
-          </p:nvPr>
-        </p:nvPicPr>
-        <p:blipFill>
-          <a:blip r:embed="rId12"/>
-          <a:stretch>
-            <a:fillRect/>
-          </a:stretch>
-        </p:blipFill>
-        <p:spPr>
-          <a:xfrm>
-            <a:off x="1120424" y="1421733"/>
-            <a:ext cx="5966176" cy="4474632"/>
-          </a:xfrm>
-          <a:prstGeom prst="rect">
-            <a:avLst/>
-          </a:prstGeom>
-        </p:spPr>
-      </p:pic>
-    </p:spTree>
-    <p:extLst>
-      <p:ext uri="{BB962C8B-B14F-4D97-AF65-F5344CB8AC3E}">
-        <p14:creationId xmlns:p14="http://schemas.microsoft.com/office/powerpoint/2010/main" val="3334194665"/>
-      </p:ext>
-    </p:extLst>
-  </p:cSld>
-  <p:clrMapOvr>
-    <a:masterClrMapping/>
-  </p:clrMapOvr>
-  <mc:AlternateContent xmlns:mc="http://schemas.openxmlformats.org/markup-compatibility/2006" xmlns:p159="http://schemas.microsoft.com/office/powerpoint/2015/09/main">
-    <mc:Choice Requires="p159">
-      <p:transition xmlns:p14="http://schemas.microsoft.com/office/powerpoint/2010/main" spd="slow" p14:dur="2000">
-        <p159:morph option="byObject"/>
-      </p:transition>
-    </mc:Choice>
-    <mc:Fallback xmlns="">
-      <p:transition spd="slow">
-        <p:fade/>
-      </p:transition>
-    </mc:Fallback>
-  </mc:AlternateContent>
-  <p:timing>
-    <p:tnLst>
-      <p:par>
-        <p:cTn id="1" dur="indefinite" restart="never" nodeType="tmRoot">
-          <p:childTnLst>
-            <p:video>
-              <p:cMediaNode vol="80000">
-                <p:cTn id="2" fill="hold" display="0">
-                  <p:stCondLst>
-                    <p:cond delay="indefinite"/>
-                  </p:stCondLst>
-                </p:cTn>
-                <p:tgtEl>
-                  <p:spTgt spid="2"/>
-                </p:tgtEl>
-              </p:cMediaNode>
-            </p:video>
-            <p:video>
-              <p:cMediaNode vol="80000">
-                <p:cTn id="3" fill="hold" display="0">
-                  <p:stCondLst>
-                    <p:cond delay="indefinite"/>
-                  </p:stCondLst>
-                </p:cTn>
-                <p:tgtEl>
-                  <p:spTgt spid="4"/>
-                </p:tgtEl>
-              </p:cMediaNode>
-            </p:video>
-            <p:video>
-              <p:cMediaNode>
-                <p:cTn id="4" fill="hold" display="0">
-                  <p:stCondLst>
-                    <p:cond delay="indefinite"/>
-                  </p:stCondLst>
-                  <p:endCondLst>
-                    <p:cond evt="onNext" delay="0">
-                      <p:tgtEl>
-                        <p:sldTgt/>
-                      </p:tgtEl>
-                    </p:cond>
-                    <p:cond evt="onPrev" delay="0">
-                      <p:tgtEl>
-                        <p:sldTgt/>
-                      </p:tgtEl>
-                    </p:cond>
-                  </p:endCondLst>
-                </p:cTn>
-                <p:tgtEl>
-                  <p:spTgt spid="7"/>
-                </p:tgtEl>
-              </p:cMediaNode>
-            </p:video>
-            <p:video>
-              <p:cMediaNode>
-                <p:cTn id="5" fill="hold" display="0">
-                  <p:stCondLst>
-                    <p:cond delay="indefinite"/>
-                  </p:stCondLst>
-                  <p:endCondLst>
-                    <p:cond evt="onNext" delay="0">
-                      <p:tgtEl>
-                        <p:sldTgt/>
-                      </p:tgtEl>
-                    </p:cond>
-                    <p:cond evt="onPrev" delay="0">
-                      <p:tgtEl>
-                        <p:sldTgt/>
-                      </p:tgtEl>
-                    </p:cond>
-                  </p:endCondLst>
-                </p:cTn>
-                <p:tgtEl>
-                  <p:spTgt spid="8"/>
-                </p:tgtEl>
-              </p:cMediaNode>
-            </p:video>
-          </p:childTnLst>
-        </p:cTn>
-      </p:par>
-    </p:tnLst>
-  </p:timing>
-</p:sld>
-</file>
-
 <file path=ppt/tags/tag1.xml><?xml version="1.0" encoding="utf-8"?>
 <p:tagLst xmlns:a="http://schemas.openxmlformats.org/drawingml/2006/main" xmlns:r="http://schemas.openxmlformats.org/officeDocument/2006/relationships" xmlns:p="http://schemas.openxmlformats.org/presentationml/2006/main">
   <p:tag name="IIW_TYPE_IMAGE" val="Text Box 3"/>
-</p:tagLst>
-</file>
-
-<file path=ppt/tags/tag10.xml><?xml version="1.0" encoding="utf-8"?>
-<p:tagLst xmlns:a="http://schemas.openxmlformats.org/drawingml/2006/main" xmlns:r="http://schemas.openxmlformats.org/officeDocument/2006/relationships" xmlns:p="http://schemas.openxmlformats.org/presentationml/2006/main">
-  <p:tag name="IIW_TYPE_CAPTION" val="Picture 2"/>
 </p:tagLst>
 </file>
 
@@ -11360,36 +7376,6 @@
 </file>
 
 <file path=ppt/tags/tag4.xml><?xml version="1.0" encoding="utf-8"?>
-<p:tagLst xmlns:a="http://schemas.openxmlformats.org/drawingml/2006/main" xmlns:r="http://schemas.openxmlformats.org/officeDocument/2006/relationships" xmlns:p="http://schemas.openxmlformats.org/presentationml/2006/main">
-  <p:tag name="IIW_TYPE_IMAGE" val="Text Box 3"/>
-</p:tagLst>
-</file>
-
-<file path=ppt/tags/tag5.xml><?xml version="1.0" encoding="utf-8"?>
-<p:tagLst xmlns:a="http://schemas.openxmlformats.org/drawingml/2006/main" xmlns:r="http://schemas.openxmlformats.org/officeDocument/2006/relationships" xmlns:p="http://schemas.openxmlformats.org/presentationml/2006/main">
-  <p:tag name="IIW_TYPE_CAPTION" val="Picture 2"/>
-</p:tagLst>
-</file>
-
-<file path=ppt/tags/tag6.xml><?xml version="1.0" encoding="utf-8"?>
-<p:tagLst xmlns:a="http://schemas.openxmlformats.org/drawingml/2006/main" xmlns:r="http://schemas.openxmlformats.org/officeDocument/2006/relationships" xmlns:p="http://schemas.openxmlformats.org/presentationml/2006/main">
-  <p:tag name="IIW_TYPE_IMAGE" val="Text Box 3"/>
-</p:tagLst>
-</file>
-
-<file path=ppt/tags/tag7.xml><?xml version="1.0" encoding="utf-8"?>
-<p:tagLst xmlns:a="http://schemas.openxmlformats.org/drawingml/2006/main" xmlns:r="http://schemas.openxmlformats.org/officeDocument/2006/relationships" xmlns:p="http://schemas.openxmlformats.org/presentationml/2006/main">
-  <p:tag name="IIW_TYPE_IMAGE" val="Text Box 3"/>
-</p:tagLst>
-</file>
-
-<file path=ppt/tags/tag8.xml><?xml version="1.0" encoding="utf-8"?>
-<p:tagLst xmlns:a="http://schemas.openxmlformats.org/drawingml/2006/main" xmlns:r="http://schemas.openxmlformats.org/officeDocument/2006/relationships" xmlns:p="http://schemas.openxmlformats.org/presentationml/2006/main">
-  <p:tag name="IIW_TYPE_CAPTION" val="Picture 2"/>
-</p:tagLst>
-</file>
-
-<file path=ppt/tags/tag9.xml><?xml version="1.0" encoding="utf-8"?>
 <p:tagLst xmlns:a="http://schemas.openxmlformats.org/drawingml/2006/main" xmlns:r="http://schemas.openxmlformats.org/officeDocument/2006/relationships" xmlns:p="http://schemas.openxmlformats.org/presentationml/2006/main">
   <p:tag name="IIW_TYPE_IMAGE" val="Text Box 3"/>
 </p:tagLst>
@@ -12680,17 +8666,8 @@
 </file>
 
 <file path=customXml/item1.xml><?xml version="1.0" encoding="utf-8"?>
-<?mso-contentType ?>
-<FormTemplates xmlns="http://schemas.microsoft.com/sharepoint/v3/contenttype/forms">
-  <Display>DocumentLibraryForm</Display>
-  <Edit>DocumentLibraryForm</Edit>
-  <New>DocumentLibraryForm</New>
-</FormTemplates>
-</file>
-
-<file path=customXml/item2.xml><?xml version="1.0" encoding="utf-8"?>
-<ct:contentTypeSchema xmlns:ct="http://schemas.microsoft.com/office/2006/metadata/contentType" xmlns:ma="http://schemas.microsoft.com/office/2006/metadata/properties/metaAttributes" ct:_="" ma:_="" ma:contentTypeName="Document" ma:contentTypeID="0x010100140A42B38915AC4EBAF791562DC92B4E" ma:contentTypeVersion="12" ma:contentTypeDescription="Create a new document." ma:contentTypeScope="" ma:versionID="4940a5bbaa78008d3a998d5d5aca4007">
-  <xsd:schema xmlns:xsd="http://www.w3.org/2001/XMLSchema" xmlns:xs="http://www.w3.org/2001/XMLSchema" xmlns:p="http://schemas.microsoft.com/office/2006/metadata/properties" xmlns:ns2="5bbddf2c-15bd-4cee-88ee-4bb358fdb5d4" xmlns:ns3="0ffa7682-a752-4ec2-9b00-944c9a00bbe9" targetNamespace="http://schemas.microsoft.com/office/2006/metadata/properties" ma:root="true" ma:fieldsID="4658b3216de9186052934391234322c9" ns2:_="" ns3:_="">
+<ct:contentTypeSchema xmlns:ct="http://schemas.microsoft.com/office/2006/metadata/contentType" xmlns:ma="http://schemas.microsoft.com/office/2006/metadata/properties/metaAttributes" ct:_="" ma:_="" ma:contentTypeName="Document" ma:contentTypeID="0x010100140A42B38915AC4EBAF791562DC92B4E" ma:contentTypeVersion="13" ma:contentTypeDescription="Create a new document." ma:contentTypeScope="" ma:versionID="45dcb3ee8ab16e94e9ce11f52f3ef1c8">
+  <xsd:schema xmlns:xsd="http://www.w3.org/2001/XMLSchema" xmlns:xs="http://www.w3.org/2001/XMLSchema" xmlns:p="http://schemas.microsoft.com/office/2006/metadata/properties" xmlns:ns2="5bbddf2c-15bd-4cee-88ee-4bb358fdb5d4" xmlns:ns3="0ffa7682-a752-4ec2-9b00-944c9a00bbe9" targetNamespace="http://schemas.microsoft.com/office/2006/metadata/properties" ma:root="true" ma:fieldsID="ee4a90daa14cdc5725b57d2c9b788eb1" ns2:_="" ns3:_="">
     <xsd:import namespace="5bbddf2c-15bd-4cee-88ee-4bb358fdb5d4"/>
     <xsd:import namespace="0ffa7682-a752-4ec2-9b00-944c9a00bbe9"/>
     <xsd:element name="properties">
@@ -12710,6 +8687,7 @@
                 <xsd:element ref="ns2:MediaServiceGenerationTime" minOccurs="0"/>
                 <xsd:element ref="ns2:MediaServiceEventHashCode" minOccurs="0"/>
                 <xsd:element ref="ns2:MediaLengthInSeconds" minOccurs="0"/>
+                <xsd:element ref="ns2:MediaServiceLocation" minOccurs="0"/>
               </xsd:all>
             </xsd:complexType>
           </xsd:element>
@@ -12772,6 +8750,11 @@
     <xsd:element name="MediaLengthInSeconds" ma:index="19" nillable="true" ma:displayName="MediaLengthInSeconds" ma:hidden="true" ma:internalName="MediaLengthInSeconds" ma:readOnly="true">
       <xsd:simpleType>
         <xsd:restriction base="dms:Unknown"/>
+      </xsd:simpleType>
+    </xsd:element>
+    <xsd:element name="MediaServiceLocation" ma:index="20" nillable="true" ma:displayName="Location" ma:indexed="true" ma:internalName="MediaServiceLocation" ma:readOnly="true">
+      <xsd:simpleType>
+        <xsd:restriction base="dms:Text"/>
       </xsd:simpleType>
     </xsd:element>
   </xsd:schema>
@@ -12889,7 +8872,31 @@
 </ct:contentTypeSchema>
 </file>
 
+<file path=customXml/item2.xml><?xml version="1.0" encoding="utf-8"?>
+<?mso-contentType ?>
+<FormTemplates xmlns="http://schemas.microsoft.com/sharepoint/v3/contenttype/forms">
+  <Display>DocumentLibraryForm</Display>
+  <Edit>DocumentLibraryForm</Edit>
+  <New>DocumentLibraryForm</New>
+</FormTemplates>
+</file>
+
+<file path=customXml/item3.xml><?xml version="1.0" encoding="utf-8"?>
+<p:properties xmlns:p="http://schemas.microsoft.com/office/2006/metadata/properties" xmlns:xsi="http://www.w3.org/2001/XMLSchema-instance" xmlns:pc="http://schemas.microsoft.com/office/infopath/2007/PartnerControls">
+  <documentManagement>
+    <TaxCatchAll xmlns="0ffa7682-a752-4ec2-9b00-944c9a00bbe9" xsi:nil="true"/>
+    <lcf76f155ced4ddcb4097134ff3c332f xmlns="5bbddf2c-15bd-4cee-88ee-4bb358fdb5d4">
+      <Terms xmlns="http://schemas.microsoft.com/office/infopath/2007/PartnerControls"/>
+    </lcf76f155ced4ddcb4097134ff3c332f>
+  </documentManagement>
+</p:properties>
+</file>
+
 <file path=customXml/itemProps1.xml><?xml version="1.0" encoding="utf-8"?>
+<ds:datastoreItem xmlns:ds="http://schemas.openxmlformats.org/officeDocument/2006/customXml" ds:itemID="{33E8FF0B-9ACB-4B42-BFAF-4AC9F78B50AC}"/>
+</file>
+
+<file path=customXml/itemProps2.xml><?xml version="1.0" encoding="utf-8"?>
 <ds:datastoreItem xmlns:ds="http://schemas.openxmlformats.org/officeDocument/2006/customXml" ds:itemID="{4CF2F30D-8F2F-493A-8A9D-B087E6186AE0}">
   <ds:schemaRefs>
     <ds:schemaRef ds:uri="http://schemas.microsoft.com/sharepoint/v3/contenttype/forms"/>
@@ -12897,21 +8904,6 @@
 </ds:datastoreItem>
 </file>
 
-<file path=customXml/itemProps2.xml><?xml version="1.0" encoding="utf-8"?>
-<ds:datastoreItem xmlns:ds="http://schemas.openxmlformats.org/officeDocument/2006/customXml" ds:itemID="{3B6BA3D4-9DC4-486B-815D-15B6D2F37E73}">
-  <ds:schemaRefs>
-    <ds:schemaRef ds:uri="http://schemas.microsoft.com/office/2006/metadata/contentType"/>
-    <ds:schemaRef ds:uri="http://schemas.microsoft.com/office/2006/metadata/properties/metaAttributes"/>
-    <ds:schemaRef ds:uri="http://www.w3.org/2001/XMLSchema"/>
-    <ds:schemaRef ds:uri="http://schemas.microsoft.com/office/2006/metadata/properties"/>
-    <ds:schemaRef ds:uri="5bbddf2c-15bd-4cee-88ee-4bb358fdb5d4"/>
-    <ds:schemaRef ds:uri="0ffa7682-a752-4ec2-9b00-944c9a00bbe9"/>
-    <ds:schemaRef ds:uri="http://schemas.microsoft.com/office/2006/documentManagement/types"/>
-    <ds:schemaRef ds:uri="http://schemas.microsoft.com/office/infopath/2007/PartnerControls"/>
-    <ds:schemaRef ds:uri="http://schemas.openxmlformats.org/package/2006/metadata/core-properties"/>
-    <ds:schemaRef ds:uri="http://purl.org/dc/elements/1.1/"/>
-    <ds:schemaRef ds:uri="http://purl.org/dc/terms/"/>
-    <ds:schemaRef ds:uri="http://schemas.microsoft.com/internal/obd"/>
-  </ds:schemaRefs>
-</ds:datastoreItem>
+<file path=customXml/itemProps3.xml><?xml version="1.0" encoding="utf-8"?>
+<ds:datastoreItem xmlns:ds="http://schemas.openxmlformats.org/officeDocument/2006/customXml" ds:itemID="{BEDB5712-C48F-437F-B73F-16C8665DE9D2}"/>
 </file>
</xml_diff>